<commit_message>
re-ran the gapfill process. made some advancements on the qa program
</commit_message>
<xml_diff>
--- a/documentation/schematic.pptx
+++ b/documentation/schematic.pptx
@@ -6,7 +6,13 @@
   </p:sldMasterIdLst>
   <p:sldIdLst>
     <p:sldId id="256" r:id="rId2"/>
-    <p:sldId id="257" r:id="rId3"/>
+    <p:sldId id="261" r:id="rId3"/>
+    <p:sldId id="257" r:id="rId4"/>
+    <p:sldId id="258" r:id="rId5"/>
+    <p:sldId id="259" r:id="rId6"/>
+    <p:sldId id="260" r:id="rId7"/>
+    <p:sldId id="262" r:id="rId8"/>
+    <p:sldId id="263" r:id="rId9"/>
   </p:sldIdLst>
   <p:sldSz cx="12192000" cy="6858000"/>
   <p:notesSz cx="6858000" cy="9144000"/>
@@ -105,13 +111,18 @@
       </a:defRPr>
     </a:lvl9pPr>
   </p:defaultTextStyle>
+  <p:extLst>
+    <p:ext uri="{EFAFB233-063F-42B5-8137-9DF3F51BA10A}">
+      <p15:sldGuideLst xmlns:p15="http://schemas.microsoft.com/office/powerpoint/2012/main"/>
+    </p:ext>
+  </p:extLst>
 </p:presentation>
 </file>
 
 <file path=ppt/revisionInfo.xml><?xml version="1.0" encoding="utf-8"?>
 <p1510:revInfo xmlns:a="http://schemas.openxmlformats.org/drawingml/2006/main" xmlns:r="http://schemas.openxmlformats.org/officeDocument/2006/relationships" xmlns:p1510="http://schemas.microsoft.com/office/powerpoint/2015/10/main">
   <p1510:revLst>
-    <p1510:client id="{F2A46197-B517-466D-BCA9-4F8C8F44B3E1}" v="8" dt="2019-06-20T21:19:41.079"/>
+    <p1510:client id="{F2A46197-B517-466D-BCA9-4F8C8F44B3E1}" v="207" dt="2019-07-02T13:22:51.216"/>
   </p1510:revLst>
 </p1510:revInfo>
 </file>
@@ -120,17 +131,193 @@
 <pc:chgInfo xmlns:a="http://schemas.openxmlformats.org/drawingml/2006/main" xmlns:r="http://schemas.openxmlformats.org/officeDocument/2006/relationships" xmlns:ac="http://schemas.microsoft.com/office/drawing/2013/main/command" xmlns:pc="http://schemas.microsoft.com/office/powerpoint/2013/main/command">
   <pc:docChgLst>
     <pc:chgData name="Fabio Palacio" userId="1994740e-388a-4854-93b3-cd3e145b0191" providerId="ADAL" clId="{F2A46197-B517-466D-BCA9-4F8C8F44B3E1}"/>
-    <pc:docChg chg="custSel modSld">
-      <pc:chgData name="Fabio Palacio" userId="1994740e-388a-4854-93b3-cd3e145b0191" providerId="ADAL" clId="{F2A46197-B517-466D-BCA9-4F8C8F44B3E1}" dt="2019-06-20T21:19:41.079" v="7" actId="208"/>
+    <pc:docChg chg="undo custSel addSld delSld modSld">
+      <pc:chgData name="Fabio Palacio" userId="1994740e-388a-4854-93b3-cd3e145b0191" providerId="ADAL" clId="{F2A46197-B517-466D-BCA9-4F8C8F44B3E1}" dt="2019-07-02T15:31:40.180" v="4898" actId="115"/>
       <pc:docMkLst>
         <pc:docMk/>
       </pc:docMkLst>
       <pc:sldChg chg="addSp delSp modSp">
-        <pc:chgData name="Fabio Palacio" userId="1994740e-388a-4854-93b3-cd3e145b0191" providerId="ADAL" clId="{F2A46197-B517-466D-BCA9-4F8C8F44B3E1}" dt="2019-06-20T21:19:41.079" v="7" actId="208"/>
+        <pc:chgData name="Fabio Palacio" userId="1994740e-388a-4854-93b3-cd3e145b0191" providerId="ADAL" clId="{F2A46197-B517-466D-BCA9-4F8C8F44B3E1}" dt="2019-07-02T14:15:19.081" v="1462" actId="14100"/>
         <pc:sldMkLst>
           <pc:docMk/>
           <pc:sldMk cId="3304412821" sldId="257"/>
         </pc:sldMkLst>
+        <pc:spChg chg="del mod">
+          <ac:chgData name="Fabio Palacio" userId="1994740e-388a-4854-93b3-cd3e145b0191" providerId="ADAL" clId="{F2A46197-B517-466D-BCA9-4F8C8F44B3E1}" dt="2019-07-02T13:18:36.770" v="11" actId="478"/>
+          <ac:spMkLst>
+            <pc:docMk/>
+            <pc:sldMk cId="3304412821" sldId="257"/>
+            <ac:spMk id="21" creationId="{30581ACC-F690-44D9-AA40-31A781F9D9EB}"/>
+          </ac:spMkLst>
+        </pc:spChg>
+        <pc:spChg chg="mod">
+          <ac:chgData name="Fabio Palacio" userId="1994740e-388a-4854-93b3-cd3e145b0191" providerId="ADAL" clId="{F2A46197-B517-466D-BCA9-4F8C8F44B3E1}" dt="2019-07-02T13:22:19.662" v="181" actId="1076"/>
+          <ac:spMkLst>
+            <pc:docMk/>
+            <pc:sldMk cId="3304412821" sldId="257"/>
+            <ac:spMk id="22" creationId="{DFC248A5-F583-4B1F-948B-62D7A10F608F}"/>
+          </ac:spMkLst>
+        </pc:spChg>
+        <pc:spChg chg="mod">
+          <ac:chgData name="Fabio Palacio" userId="1994740e-388a-4854-93b3-cd3e145b0191" providerId="ADAL" clId="{F2A46197-B517-466D-BCA9-4F8C8F44B3E1}" dt="2019-07-02T13:22:15.278" v="180" actId="14100"/>
+          <ac:spMkLst>
+            <pc:docMk/>
+            <pc:sldMk cId="3304412821" sldId="257"/>
+            <ac:spMk id="28" creationId="{D912ED62-F884-4878-8033-995E805292DA}"/>
+          </ac:spMkLst>
+        </pc:spChg>
+        <pc:spChg chg="add mod">
+          <ac:chgData name="Fabio Palacio" userId="1994740e-388a-4854-93b3-cd3e145b0191" providerId="ADAL" clId="{F2A46197-B517-466D-BCA9-4F8C8F44B3E1}" dt="2019-07-02T13:22:19.662" v="181" actId="1076"/>
+          <ac:spMkLst>
+            <pc:docMk/>
+            <pc:sldMk cId="3304412821" sldId="257"/>
+            <ac:spMk id="38" creationId="{17F27E98-A45B-4763-8AB0-1E4A695CE526}"/>
+          </ac:spMkLst>
+        </pc:spChg>
+        <pc:spChg chg="add mod">
+          <ac:chgData name="Fabio Palacio" userId="1994740e-388a-4854-93b3-cd3e145b0191" providerId="ADAL" clId="{F2A46197-B517-466D-BCA9-4F8C8F44B3E1}" dt="2019-07-02T13:22:51.216" v="206" actId="404"/>
+          <ac:spMkLst>
+            <pc:docMk/>
+            <pc:sldMk cId="3304412821" sldId="257"/>
+            <ac:spMk id="40" creationId="{43FCF595-3217-4AA3-B18D-D701CF72792B}"/>
+          </ac:spMkLst>
+        </pc:spChg>
+        <pc:spChg chg="add mod">
+          <ac:chgData name="Fabio Palacio" userId="1994740e-388a-4854-93b3-cd3e145b0191" providerId="ADAL" clId="{F2A46197-B517-466D-BCA9-4F8C8F44B3E1}" dt="2019-07-02T13:22:51.216" v="206" actId="404"/>
+          <ac:spMkLst>
+            <pc:docMk/>
+            <pc:sldMk cId="3304412821" sldId="257"/>
+            <ac:spMk id="46" creationId="{E7DBAA14-D028-4304-869D-1AD6C60ED370}"/>
+          </ac:spMkLst>
+        </pc:spChg>
+        <pc:spChg chg="add mod">
+          <ac:chgData name="Fabio Palacio" userId="1994740e-388a-4854-93b3-cd3e145b0191" providerId="ADAL" clId="{F2A46197-B517-466D-BCA9-4F8C8F44B3E1}" dt="2019-07-02T13:22:51.216" v="206" actId="404"/>
+          <ac:spMkLst>
+            <pc:docMk/>
+            <pc:sldMk cId="3304412821" sldId="257"/>
+            <ac:spMk id="48" creationId="{2FB4CFB8-8F97-4492-96FF-00DBA4DB802D}"/>
+          </ac:spMkLst>
+        </pc:spChg>
+        <pc:spChg chg="add mod">
+          <ac:chgData name="Fabio Palacio" userId="1994740e-388a-4854-93b3-cd3e145b0191" providerId="ADAL" clId="{F2A46197-B517-466D-BCA9-4F8C8F44B3E1}" dt="2019-07-02T13:22:51.216" v="206" actId="404"/>
+          <ac:spMkLst>
+            <pc:docMk/>
+            <pc:sldMk cId="3304412821" sldId="257"/>
+            <ac:spMk id="54" creationId="{0292E884-0F43-45AE-A025-053A0CA35180}"/>
+          </ac:spMkLst>
+        </pc:spChg>
+        <pc:spChg chg="add mod">
+          <ac:chgData name="Fabio Palacio" userId="1994740e-388a-4854-93b3-cd3e145b0191" providerId="ADAL" clId="{F2A46197-B517-466D-BCA9-4F8C8F44B3E1}" dt="2019-07-02T13:22:51.216" v="206" actId="404"/>
+          <ac:spMkLst>
+            <pc:docMk/>
+            <pc:sldMk cId="3304412821" sldId="257"/>
+            <ac:spMk id="58" creationId="{8AF01FF0-60A6-43DA-A5D2-269C118B7E4E}"/>
+          </ac:spMkLst>
+        </pc:spChg>
+        <pc:spChg chg="add mod">
+          <ac:chgData name="Fabio Palacio" userId="1994740e-388a-4854-93b3-cd3e145b0191" providerId="ADAL" clId="{F2A46197-B517-466D-BCA9-4F8C8F44B3E1}" dt="2019-07-02T13:22:51.216" v="206" actId="404"/>
+          <ac:spMkLst>
+            <pc:docMk/>
+            <pc:sldMk cId="3304412821" sldId="257"/>
+            <ac:spMk id="71" creationId="{762A7A67-5C13-4E1E-AD23-FA5C3CE25A39}"/>
+          </ac:spMkLst>
+        </pc:spChg>
+        <pc:spChg chg="add mod">
+          <ac:chgData name="Fabio Palacio" userId="1994740e-388a-4854-93b3-cd3e145b0191" providerId="ADAL" clId="{F2A46197-B517-466D-BCA9-4F8C8F44B3E1}" dt="2019-07-02T14:12:17.796" v="1346" actId="1076"/>
+          <ac:spMkLst>
+            <pc:docMk/>
+            <pc:sldMk cId="3304412821" sldId="257"/>
+            <ac:spMk id="74" creationId="{C54AEFDC-F8C0-4AA3-A3F0-C0C163E8B1B0}"/>
+          </ac:spMkLst>
+        </pc:spChg>
+        <pc:spChg chg="add mod">
+          <ac:chgData name="Fabio Palacio" userId="1994740e-388a-4854-93b3-cd3e145b0191" providerId="ADAL" clId="{F2A46197-B517-466D-BCA9-4F8C8F44B3E1}" dt="2019-07-02T14:12:17.796" v="1346" actId="1076"/>
+          <ac:spMkLst>
+            <pc:docMk/>
+            <pc:sldMk cId="3304412821" sldId="257"/>
+            <ac:spMk id="87" creationId="{8A97EE6C-3B57-45D3-8D62-7FCF82F5C359}"/>
+          </ac:spMkLst>
+        </pc:spChg>
+        <pc:spChg chg="add mod">
+          <ac:chgData name="Fabio Palacio" userId="1994740e-388a-4854-93b3-cd3e145b0191" providerId="ADAL" clId="{F2A46197-B517-466D-BCA9-4F8C8F44B3E1}" dt="2019-07-02T14:12:17.796" v="1346" actId="1076"/>
+          <ac:spMkLst>
+            <pc:docMk/>
+            <pc:sldMk cId="3304412821" sldId="257"/>
+            <ac:spMk id="92" creationId="{805BF74E-FD5B-4C55-912B-3681ED0271A9}"/>
+          </ac:spMkLst>
+        </pc:spChg>
+        <pc:spChg chg="add del">
+          <ac:chgData name="Fabio Palacio" userId="1994740e-388a-4854-93b3-cd3e145b0191" providerId="ADAL" clId="{F2A46197-B517-466D-BCA9-4F8C8F44B3E1}" dt="2019-07-02T14:12:03.667" v="1345" actId="478"/>
+          <ac:spMkLst>
+            <pc:docMk/>
+            <pc:sldMk cId="3304412821" sldId="257"/>
+            <ac:spMk id="95" creationId="{57401AF0-36FF-42B8-8192-FB602D30F36F}"/>
+          </ac:spMkLst>
+        </pc:spChg>
+        <pc:spChg chg="add del mod">
+          <ac:chgData name="Fabio Palacio" userId="1994740e-388a-4854-93b3-cd3e145b0191" providerId="ADAL" clId="{F2A46197-B517-466D-BCA9-4F8C8F44B3E1}" dt="2019-07-02T14:14:42.250" v="1451" actId="478"/>
+          <ac:spMkLst>
+            <pc:docMk/>
+            <pc:sldMk cId="3304412821" sldId="257"/>
+            <ac:spMk id="102" creationId="{31556DA0-A5EB-4BD3-8515-943A103149DB}"/>
+          </ac:spMkLst>
+        </pc:spChg>
+        <pc:spChg chg="add mod">
+          <ac:chgData name="Fabio Palacio" userId="1994740e-388a-4854-93b3-cd3e145b0191" providerId="ADAL" clId="{F2A46197-B517-466D-BCA9-4F8C8F44B3E1}" dt="2019-07-02T14:15:19.081" v="1462" actId="14100"/>
+          <ac:spMkLst>
+            <pc:docMk/>
+            <pc:sldMk cId="3304412821" sldId="257"/>
+            <ac:spMk id="103" creationId="{49F249B5-5233-4D1E-A9C8-5C51ACE7F607}"/>
+          </ac:spMkLst>
+        </pc:spChg>
+        <pc:spChg chg="add mod">
+          <ac:chgData name="Fabio Palacio" userId="1994740e-388a-4854-93b3-cd3e145b0191" providerId="ADAL" clId="{F2A46197-B517-466D-BCA9-4F8C8F44B3E1}" dt="2019-07-02T14:15:11.329" v="1460" actId="1076"/>
+          <ac:spMkLst>
+            <pc:docMk/>
+            <pc:sldMk cId="3304412821" sldId="257"/>
+            <ac:spMk id="104" creationId="{F5D4F512-0C72-4775-BFDB-D3B733D406EB}"/>
+          </ac:spMkLst>
+        </pc:spChg>
+        <pc:spChg chg="add mod">
+          <ac:chgData name="Fabio Palacio" userId="1994740e-388a-4854-93b3-cd3e145b0191" providerId="ADAL" clId="{F2A46197-B517-466D-BCA9-4F8C8F44B3E1}" dt="2019-07-02T14:15:11.329" v="1460" actId="1076"/>
+          <ac:spMkLst>
+            <pc:docMk/>
+            <pc:sldMk cId="3304412821" sldId="257"/>
+            <ac:spMk id="105" creationId="{55FE4485-C8DA-4828-ABFA-D9B96B081BBC}"/>
+          </ac:spMkLst>
+        </pc:spChg>
+        <pc:spChg chg="add mod">
+          <ac:chgData name="Fabio Palacio" userId="1994740e-388a-4854-93b3-cd3e145b0191" providerId="ADAL" clId="{F2A46197-B517-466D-BCA9-4F8C8F44B3E1}" dt="2019-07-02T14:15:11.329" v="1460" actId="1076"/>
+          <ac:spMkLst>
+            <pc:docMk/>
+            <pc:sldMk cId="3304412821" sldId="257"/>
+            <ac:spMk id="106" creationId="{FDAFAE74-B4DC-4064-A546-1F87D506AB27}"/>
+          </ac:spMkLst>
+        </pc:spChg>
+        <pc:cxnChg chg="mod">
+          <ac:chgData name="Fabio Palacio" userId="1994740e-388a-4854-93b3-cd3e145b0191" providerId="ADAL" clId="{F2A46197-B517-466D-BCA9-4F8C8F44B3E1}" dt="2019-07-02T13:22:19.662" v="181" actId="1076"/>
+          <ac:cxnSpMkLst>
+            <pc:docMk/>
+            <pc:sldMk cId="3304412821" sldId="257"/>
+            <ac:cxnSpMk id="24" creationId="{B39F43F8-D0DE-4368-8D76-F60F18286933}"/>
+          </ac:cxnSpMkLst>
+        </pc:cxnChg>
+        <pc:cxnChg chg="mod">
+          <ac:chgData name="Fabio Palacio" userId="1994740e-388a-4854-93b3-cd3e145b0191" providerId="ADAL" clId="{F2A46197-B517-466D-BCA9-4F8C8F44B3E1}" dt="2019-07-02T13:22:19.662" v="181" actId="1076"/>
+          <ac:cxnSpMkLst>
+            <pc:docMk/>
+            <pc:sldMk cId="3304412821" sldId="257"/>
+            <ac:cxnSpMk id="26" creationId="{A81D72B9-FE91-43FA-8DF7-463D59419A77}"/>
+          </ac:cxnSpMkLst>
+        </pc:cxnChg>
+        <pc:cxnChg chg="mod">
+          <ac:chgData name="Fabio Palacio" userId="1994740e-388a-4854-93b3-cd3e145b0191" providerId="ADAL" clId="{F2A46197-B517-466D-BCA9-4F8C8F44B3E1}" dt="2019-07-02T13:22:15.278" v="180" actId="14100"/>
+          <ac:cxnSpMkLst>
+            <pc:docMk/>
+            <pc:sldMk cId="3304412821" sldId="257"/>
+            <ac:cxnSpMk id="33" creationId="{859A2402-AD7F-49EA-9CC3-0827FF8ECD62}"/>
+          </ac:cxnSpMkLst>
+        </pc:cxnChg>
         <pc:cxnChg chg="mod">
           <ac:chgData name="Fabio Palacio" userId="1994740e-388a-4854-93b3-cd3e145b0191" providerId="ADAL" clId="{F2A46197-B517-466D-BCA9-4F8C8F44B3E1}" dt="2019-06-20T21:19:41.079" v="7" actId="208"/>
           <ac:cxnSpMkLst>
@@ -155,12 +342,92 @@
             <ac:cxnSpMk id="42" creationId="{C1F8E99D-16AC-4FCE-BA02-C959B1DAF037}"/>
           </ac:cxnSpMkLst>
         </pc:cxnChg>
+        <pc:cxnChg chg="add mod">
+          <ac:chgData name="Fabio Palacio" userId="1994740e-388a-4854-93b3-cd3e145b0191" providerId="ADAL" clId="{F2A46197-B517-466D-BCA9-4F8C8F44B3E1}" dt="2019-07-02T13:22:32.603" v="187" actId="1035"/>
+          <ac:cxnSpMkLst>
+            <pc:docMk/>
+            <pc:sldMk cId="3304412821" sldId="257"/>
+            <ac:cxnSpMk id="45" creationId="{8F2F340B-2404-44AE-A119-74695BE88285}"/>
+          </ac:cxnSpMkLst>
+        </pc:cxnChg>
+        <pc:cxnChg chg="add mod">
+          <ac:chgData name="Fabio Palacio" userId="1994740e-388a-4854-93b3-cd3e145b0191" providerId="ADAL" clId="{F2A46197-B517-466D-BCA9-4F8C8F44B3E1}" dt="2019-07-02T13:22:07.714" v="178" actId="14100"/>
+          <ac:cxnSpMkLst>
+            <pc:docMk/>
+            <pc:sldMk cId="3304412821" sldId="257"/>
+            <ac:cxnSpMk id="47" creationId="{B2880E58-2C6C-4EFA-9DA9-C9FB3707428F}"/>
+          </ac:cxnSpMkLst>
+        </pc:cxnChg>
+        <pc:cxnChg chg="add mod">
+          <ac:chgData name="Fabio Palacio" userId="1994740e-388a-4854-93b3-cd3e145b0191" providerId="ADAL" clId="{F2A46197-B517-466D-BCA9-4F8C8F44B3E1}" dt="2019-07-02T13:22:07.714" v="178" actId="14100"/>
+          <ac:cxnSpMkLst>
+            <pc:docMk/>
+            <pc:sldMk cId="3304412821" sldId="257"/>
+            <ac:cxnSpMk id="49" creationId="{45579E44-CCEC-4A9A-A54C-8D7223C0ED36}"/>
+          </ac:cxnSpMkLst>
+        </pc:cxnChg>
+        <pc:cxnChg chg="add mod">
+          <ac:chgData name="Fabio Palacio" userId="1994740e-388a-4854-93b3-cd3e145b0191" providerId="ADAL" clId="{F2A46197-B517-466D-BCA9-4F8C8F44B3E1}" dt="2019-07-02T13:22:07.714" v="178" actId="14100"/>
+          <ac:cxnSpMkLst>
+            <pc:docMk/>
+            <pc:sldMk cId="3304412821" sldId="257"/>
+            <ac:cxnSpMk id="55" creationId="{947A0BD8-3C19-41BA-B29A-38C79809BB29}"/>
+          </ac:cxnSpMkLst>
+        </pc:cxnChg>
+        <pc:cxnChg chg="add mod">
+          <ac:chgData name="Fabio Palacio" userId="1994740e-388a-4854-93b3-cd3e145b0191" providerId="ADAL" clId="{F2A46197-B517-466D-BCA9-4F8C8F44B3E1}" dt="2019-07-02T13:22:07.714" v="178" actId="14100"/>
+          <ac:cxnSpMkLst>
+            <pc:docMk/>
+            <pc:sldMk cId="3304412821" sldId="257"/>
+            <ac:cxnSpMk id="59" creationId="{A7A8977E-9BF3-474B-8569-B4042810E14A}"/>
+          </ac:cxnSpMkLst>
+        </pc:cxnChg>
+        <pc:cxnChg chg="add mod">
+          <ac:chgData name="Fabio Palacio" userId="1994740e-388a-4854-93b3-cd3e145b0191" providerId="ADAL" clId="{F2A46197-B517-466D-BCA9-4F8C8F44B3E1}" dt="2019-07-02T13:22:29.750" v="184" actId="14100"/>
+          <ac:cxnSpMkLst>
+            <pc:docMk/>
+            <pc:sldMk cId="3304412821" sldId="257"/>
+            <ac:cxnSpMk id="72" creationId="{6DE7C603-D731-4BD2-BE0A-0DC38ED0AB40}"/>
+          </ac:cxnSpMkLst>
+        </pc:cxnChg>
+        <pc:cxnChg chg="add mod">
+          <ac:chgData name="Fabio Palacio" userId="1994740e-388a-4854-93b3-cd3e145b0191" providerId="ADAL" clId="{F2A46197-B517-466D-BCA9-4F8C8F44B3E1}" dt="2019-07-02T14:12:17.796" v="1346" actId="1076"/>
+          <ac:cxnSpMkLst>
+            <pc:docMk/>
+            <pc:sldMk cId="3304412821" sldId="257"/>
+            <ac:cxnSpMk id="75" creationId="{DB834A91-058F-4BB7-8E06-2A9DC722D458}"/>
+          </ac:cxnSpMkLst>
+        </pc:cxnChg>
+        <pc:cxnChg chg="add mod">
+          <ac:chgData name="Fabio Palacio" userId="1994740e-388a-4854-93b3-cd3e145b0191" providerId="ADAL" clId="{F2A46197-B517-466D-BCA9-4F8C8F44B3E1}" dt="2019-07-02T14:12:17.796" v="1346" actId="1076"/>
+          <ac:cxnSpMkLst>
+            <pc:docMk/>
+            <pc:sldMk cId="3304412821" sldId="257"/>
+            <ac:cxnSpMk id="83" creationId="{4AABC1D8-9BE3-435A-B93F-D0485047D5AF}"/>
+          </ac:cxnSpMkLst>
+        </pc:cxnChg>
         <pc:cxnChg chg="mod">
           <ac:chgData name="Fabio Palacio" userId="1994740e-388a-4854-93b3-cd3e145b0191" providerId="ADAL" clId="{F2A46197-B517-466D-BCA9-4F8C8F44B3E1}" dt="2019-06-20T21:18:38.479" v="1" actId="208"/>
           <ac:cxnSpMkLst>
             <pc:docMk/>
             <pc:sldMk cId="3304412821" sldId="257"/>
             <ac:cxnSpMk id="88" creationId="{F21499E1-7C03-4B7C-B13E-822BD1410E37}"/>
+          </ac:cxnSpMkLst>
+        </pc:cxnChg>
+        <pc:cxnChg chg="add mod">
+          <ac:chgData name="Fabio Palacio" userId="1994740e-388a-4854-93b3-cd3e145b0191" providerId="ADAL" clId="{F2A46197-B517-466D-BCA9-4F8C8F44B3E1}" dt="2019-07-02T14:12:20.642" v="1347" actId="14100"/>
+          <ac:cxnSpMkLst>
+            <pc:docMk/>
+            <pc:sldMk cId="3304412821" sldId="257"/>
+            <ac:cxnSpMk id="89" creationId="{7C8EFE64-CE65-41BA-BDDB-824B007585AB}"/>
+          </ac:cxnSpMkLst>
+        </pc:cxnChg>
+        <pc:cxnChg chg="add mod">
+          <ac:chgData name="Fabio Palacio" userId="1994740e-388a-4854-93b3-cd3e145b0191" providerId="ADAL" clId="{F2A46197-B517-466D-BCA9-4F8C8F44B3E1}" dt="2019-07-02T14:12:17.796" v="1346" actId="1076"/>
+          <ac:cxnSpMkLst>
+            <pc:docMk/>
+            <pc:sldMk cId="3304412821" sldId="257"/>
+            <ac:cxnSpMk id="90" creationId="{15FDC950-BE15-4EF3-AD8C-DDABEDF89CCA}"/>
           </ac:cxnSpMkLst>
         </pc:cxnChg>
         <pc:cxnChg chg="add mod">
@@ -179,6 +446,263 @@
             <ac:cxnSpMk id="92" creationId="{8AB45D87-86BF-41E3-AB49-EC7A58E732D2}"/>
           </ac:cxnSpMkLst>
         </pc:cxnChg>
+        <pc:cxnChg chg="add mod">
+          <ac:chgData name="Fabio Palacio" userId="1994740e-388a-4854-93b3-cd3e145b0191" providerId="ADAL" clId="{F2A46197-B517-466D-BCA9-4F8C8F44B3E1}" dt="2019-07-02T14:12:17.796" v="1346" actId="1076"/>
+          <ac:cxnSpMkLst>
+            <pc:docMk/>
+            <pc:sldMk cId="3304412821" sldId="257"/>
+            <ac:cxnSpMk id="93" creationId="{5AC11D6A-68B6-401A-B81B-016AF235E51D}"/>
+          </ac:cxnSpMkLst>
+        </pc:cxnChg>
+        <pc:cxnChg chg="add del mod">
+          <ac:chgData name="Fabio Palacio" userId="1994740e-388a-4854-93b3-cd3e145b0191" providerId="ADAL" clId="{F2A46197-B517-466D-BCA9-4F8C8F44B3E1}" dt="2019-07-02T14:12:03.667" v="1345" actId="478"/>
+          <ac:cxnSpMkLst>
+            <pc:docMk/>
+            <pc:sldMk cId="3304412821" sldId="257"/>
+            <ac:cxnSpMk id="96" creationId="{D4695D26-A71D-43C4-A6C0-2E1B06E2D7D5}"/>
+          </ac:cxnSpMkLst>
+        </pc:cxnChg>
+      </pc:sldChg>
+      <pc:sldChg chg="modSp add">
+        <pc:chgData name="Fabio Palacio" userId="1994740e-388a-4854-93b3-cd3e145b0191" providerId="ADAL" clId="{F2A46197-B517-466D-BCA9-4F8C8F44B3E1}" dt="2019-07-02T13:56:45.744" v="914" actId="20577"/>
+        <pc:sldMkLst>
+          <pc:docMk/>
+          <pc:sldMk cId="3874044249" sldId="258"/>
+        </pc:sldMkLst>
+        <pc:spChg chg="mod">
+          <ac:chgData name="Fabio Palacio" userId="1994740e-388a-4854-93b3-cd3e145b0191" providerId="ADAL" clId="{F2A46197-B517-466D-BCA9-4F8C8F44B3E1}" dt="2019-07-02T13:24:22.570" v="220" actId="20577"/>
+          <ac:spMkLst>
+            <pc:docMk/>
+            <pc:sldMk cId="3874044249" sldId="258"/>
+            <ac:spMk id="2" creationId="{67A03E4A-E099-4FDC-AA4B-675A24851E05}"/>
+          </ac:spMkLst>
+        </pc:spChg>
+        <pc:spChg chg="mod">
+          <ac:chgData name="Fabio Palacio" userId="1994740e-388a-4854-93b3-cd3e145b0191" providerId="ADAL" clId="{F2A46197-B517-466D-BCA9-4F8C8F44B3E1}" dt="2019-07-02T13:56:45.744" v="914" actId="20577"/>
+          <ac:spMkLst>
+            <pc:docMk/>
+            <pc:sldMk cId="3874044249" sldId="258"/>
+            <ac:spMk id="3" creationId="{3C0F9A91-3557-4651-ABC2-505DB9D4ACC1}"/>
+          </ac:spMkLst>
+        </pc:spChg>
+      </pc:sldChg>
+      <pc:sldChg chg="addSp delSp modSp add">
+        <pc:chgData name="Fabio Palacio" userId="1994740e-388a-4854-93b3-cd3e145b0191" providerId="ADAL" clId="{F2A46197-B517-466D-BCA9-4F8C8F44B3E1}" dt="2019-07-02T15:07:37.088" v="4216" actId="14100"/>
+        <pc:sldMkLst>
+          <pc:docMk/>
+          <pc:sldMk cId="13990037" sldId="259"/>
+        </pc:sldMkLst>
+        <pc:spChg chg="mod">
+          <ac:chgData name="Fabio Palacio" userId="1994740e-388a-4854-93b3-cd3e145b0191" providerId="ADAL" clId="{F2A46197-B517-466D-BCA9-4F8C8F44B3E1}" dt="2019-07-02T14:03:57.352" v="1229" actId="6549"/>
+          <ac:spMkLst>
+            <pc:docMk/>
+            <pc:sldMk cId="13990037" sldId="259"/>
+            <ac:spMk id="2" creationId="{A4913245-CE3F-448C-883F-F8E59B75B2DF}"/>
+          </ac:spMkLst>
+        </pc:spChg>
+        <pc:spChg chg="mod">
+          <ac:chgData name="Fabio Palacio" userId="1994740e-388a-4854-93b3-cd3e145b0191" providerId="ADAL" clId="{F2A46197-B517-466D-BCA9-4F8C8F44B3E1}" dt="2019-07-02T15:07:37.088" v="4216" actId="14100"/>
+          <ac:spMkLst>
+            <pc:docMk/>
+            <pc:sldMk cId="13990037" sldId="259"/>
+            <ac:spMk id="3" creationId="{96E839CF-DF3C-41E9-A44E-FC7B80BF283F}"/>
+          </ac:spMkLst>
+        </pc:spChg>
+        <pc:spChg chg="add mod">
+          <ac:chgData name="Fabio Palacio" userId="1994740e-388a-4854-93b3-cd3e145b0191" providerId="ADAL" clId="{F2A46197-B517-466D-BCA9-4F8C8F44B3E1}" dt="2019-07-02T14:04:08.084" v="1235" actId="403"/>
+          <ac:spMkLst>
+            <pc:docMk/>
+            <pc:sldMk cId="13990037" sldId="259"/>
+            <ac:spMk id="4" creationId="{98853284-4B0A-47F4-A908-7850CBD93FE6}"/>
+          </ac:spMkLst>
+        </pc:spChg>
+        <pc:spChg chg="add del">
+          <ac:chgData name="Fabio Palacio" userId="1994740e-388a-4854-93b3-cd3e145b0191" providerId="ADAL" clId="{F2A46197-B517-466D-BCA9-4F8C8F44B3E1}" dt="2019-07-02T14:39:09.767" v="2221"/>
+          <ac:spMkLst>
+            <pc:docMk/>
+            <pc:sldMk cId="13990037" sldId="259"/>
+            <ac:spMk id="5" creationId="{AE3461F5-F6FF-4B8B-A32A-BF5217C45AE4}"/>
+          </ac:spMkLst>
+        </pc:spChg>
+      </pc:sldChg>
+      <pc:sldChg chg="add del">
+        <pc:chgData name="Fabio Palacio" userId="1994740e-388a-4854-93b3-cd3e145b0191" providerId="ADAL" clId="{F2A46197-B517-466D-BCA9-4F8C8F44B3E1}" dt="2019-07-02T13:24:46.321" v="222" actId="2696"/>
+        <pc:sldMkLst>
+          <pc:docMk/>
+          <pc:sldMk cId="3457745579" sldId="259"/>
+        </pc:sldMkLst>
+      </pc:sldChg>
+      <pc:sldChg chg="addSp modSp add">
+        <pc:chgData name="Fabio Palacio" userId="1994740e-388a-4854-93b3-cd3e145b0191" providerId="ADAL" clId="{F2A46197-B517-466D-BCA9-4F8C8F44B3E1}" dt="2019-07-02T14:59:06.085" v="3658" actId="20577"/>
+        <pc:sldMkLst>
+          <pc:docMk/>
+          <pc:sldMk cId="69601052" sldId="260"/>
+        </pc:sldMkLst>
+        <pc:spChg chg="mod">
+          <ac:chgData name="Fabio Palacio" userId="1994740e-388a-4854-93b3-cd3e145b0191" providerId="ADAL" clId="{F2A46197-B517-466D-BCA9-4F8C8F44B3E1}" dt="2019-07-02T14:43:31.174" v="2313" actId="6549"/>
+          <ac:spMkLst>
+            <pc:docMk/>
+            <pc:sldMk cId="69601052" sldId="260"/>
+            <ac:spMk id="2" creationId="{A4913245-CE3F-448C-883F-F8E59B75B2DF}"/>
+          </ac:spMkLst>
+        </pc:spChg>
+        <pc:spChg chg="mod">
+          <ac:chgData name="Fabio Palacio" userId="1994740e-388a-4854-93b3-cd3e145b0191" providerId="ADAL" clId="{F2A46197-B517-466D-BCA9-4F8C8F44B3E1}" dt="2019-07-02T14:59:06.085" v="3658" actId="20577"/>
+          <ac:spMkLst>
+            <pc:docMk/>
+            <pc:sldMk cId="69601052" sldId="260"/>
+            <ac:spMk id="3" creationId="{96E839CF-DF3C-41E9-A44E-FC7B80BF283F}"/>
+          </ac:spMkLst>
+        </pc:spChg>
+        <pc:spChg chg="add mod">
+          <ac:chgData name="Fabio Palacio" userId="1994740e-388a-4854-93b3-cd3e145b0191" providerId="ADAL" clId="{F2A46197-B517-466D-BCA9-4F8C8F44B3E1}" dt="2019-07-02T14:43:48.233" v="2324" actId="14100"/>
+          <ac:spMkLst>
+            <pc:docMk/>
+            <pc:sldMk cId="69601052" sldId="260"/>
+            <ac:spMk id="5" creationId="{C5BC2997-F9E6-459D-9F42-B863AF7882E9}"/>
+          </ac:spMkLst>
+        </pc:spChg>
+        <pc:spChg chg="add mod">
+          <ac:chgData name="Fabio Palacio" userId="1994740e-388a-4854-93b3-cd3e145b0191" providerId="ADAL" clId="{F2A46197-B517-466D-BCA9-4F8C8F44B3E1}" dt="2019-07-02T14:46:48.642" v="2657" actId="14100"/>
+          <ac:spMkLst>
+            <pc:docMk/>
+            <pc:sldMk cId="69601052" sldId="260"/>
+            <ac:spMk id="6" creationId="{3862965F-52D8-4BF4-94E4-C13C96FB2346}"/>
+          </ac:spMkLst>
+        </pc:spChg>
+        <pc:spChg chg="add mod">
+          <ac:chgData name="Fabio Palacio" userId="1994740e-388a-4854-93b3-cd3e145b0191" providerId="ADAL" clId="{F2A46197-B517-466D-BCA9-4F8C8F44B3E1}" dt="2019-07-02T14:47:07.582" v="2667" actId="20577"/>
+          <ac:spMkLst>
+            <pc:docMk/>
+            <pc:sldMk cId="69601052" sldId="260"/>
+            <ac:spMk id="7" creationId="{5B8353A7-26CC-4FC4-AE32-DBCED4F88351}"/>
+          </ac:spMkLst>
+        </pc:spChg>
+        <pc:spChg chg="add mod">
+          <ac:chgData name="Fabio Palacio" userId="1994740e-388a-4854-93b3-cd3e145b0191" providerId="ADAL" clId="{F2A46197-B517-466D-BCA9-4F8C8F44B3E1}" dt="2019-07-02T14:46:54.809" v="2658" actId="14100"/>
+          <ac:spMkLst>
+            <pc:docMk/>
+            <pc:sldMk cId="69601052" sldId="260"/>
+            <ac:spMk id="8" creationId="{87F0DC01-E98D-4BF1-B815-0C75FA3D8BF0}"/>
+          </ac:spMkLst>
+        </pc:spChg>
+        <pc:spChg chg="add mod">
+          <ac:chgData name="Fabio Palacio" userId="1994740e-388a-4854-93b3-cd3e145b0191" providerId="ADAL" clId="{F2A46197-B517-466D-BCA9-4F8C8F44B3E1}" dt="2019-07-02T14:57:54.762" v="3413" actId="1076"/>
+          <ac:spMkLst>
+            <pc:docMk/>
+            <pc:sldMk cId="69601052" sldId="260"/>
+            <ac:spMk id="9" creationId="{6F61E7D6-851C-4A9B-A9E5-B732E857C084}"/>
+          </ac:spMkLst>
+        </pc:spChg>
+      </pc:sldChg>
+      <pc:sldChg chg="modSp add">
+        <pc:chgData name="Fabio Palacio" userId="1994740e-388a-4854-93b3-cd3e145b0191" providerId="ADAL" clId="{F2A46197-B517-466D-BCA9-4F8C8F44B3E1}" dt="2019-07-02T15:31:40.180" v="4898" actId="115"/>
+        <pc:sldMkLst>
+          <pc:docMk/>
+          <pc:sldMk cId="414697160" sldId="261"/>
+        </pc:sldMkLst>
+        <pc:spChg chg="mod">
+          <ac:chgData name="Fabio Palacio" userId="1994740e-388a-4854-93b3-cd3e145b0191" providerId="ADAL" clId="{F2A46197-B517-466D-BCA9-4F8C8F44B3E1}" dt="2019-07-02T14:49:27.091" v="2691" actId="20577"/>
+          <ac:spMkLst>
+            <pc:docMk/>
+            <pc:sldMk cId="414697160" sldId="261"/>
+            <ac:spMk id="2" creationId="{67A03E4A-E099-4FDC-AA4B-675A24851E05}"/>
+          </ac:spMkLst>
+        </pc:spChg>
+        <pc:spChg chg="mod">
+          <ac:chgData name="Fabio Palacio" userId="1994740e-388a-4854-93b3-cd3e145b0191" providerId="ADAL" clId="{F2A46197-B517-466D-BCA9-4F8C8F44B3E1}" dt="2019-07-02T15:31:40.180" v="4898" actId="115"/>
+          <ac:spMkLst>
+            <pc:docMk/>
+            <pc:sldMk cId="414697160" sldId="261"/>
+            <ac:spMk id="3" creationId="{3C0F9A91-3557-4651-ABC2-505DB9D4ACC1}"/>
+          </ac:spMkLst>
+        </pc:spChg>
+      </pc:sldChg>
+      <pc:sldChg chg="addSp delSp modSp add">
+        <pc:chgData name="Fabio Palacio" userId="1994740e-388a-4854-93b3-cd3e145b0191" providerId="ADAL" clId="{F2A46197-B517-466D-BCA9-4F8C8F44B3E1}" dt="2019-07-02T15:04:41.740" v="3923" actId="20577"/>
+        <pc:sldMkLst>
+          <pc:docMk/>
+          <pc:sldMk cId="4285604835" sldId="262"/>
+        </pc:sldMkLst>
+        <pc:spChg chg="mod">
+          <ac:chgData name="Fabio Palacio" userId="1994740e-388a-4854-93b3-cd3e145b0191" providerId="ADAL" clId="{F2A46197-B517-466D-BCA9-4F8C8F44B3E1}" dt="2019-07-02T15:04:41.740" v="3923" actId="20577"/>
+          <ac:spMkLst>
+            <pc:docMk/>
+            <pc:sldMk cId="4285604835" sldId="262"/>
+            <ac:spMk id="3" creationId="{96E839CF-DF3C-41E9-A44E-FC7B80BF283F}"/>
+          </ac:spMkLst>
+        </pc:spChg>
+        <pc:spChg chg="del">
+          <ac:chgData name="Fabio Palacio" userId="1994740e-388a-4854-93b3-cd3e145b0191" providerId="ADAL" clId="{F2A46197-B517-466D-BCA9-4F8C8F44B3E1}" dt="2019-07-02T14:59:15.895" v="3660" actId="478"/>
+          <ac:spMkLst>
+            <pc:docMk/>
+            <pc:sldMk cId="4285604835" sldId="262"/>
+            <ac:spMk id="5" creationId="{C5BC2997-F9E6-459D-9F42-B863AF7882E9}"/>
+          </ac:spMkLst>
+        </pc:spChg>
+        <pc:spChg chg="del">
+          <ac:chgData name="Fabio Palacio" userId="1994740e-388a-4854-93b3-cd3e145b0191" providerId="ADAL" clId="{F2A46197-B517-466D-BCA9-4F8C8F44B3E1}" dt="2019-07-02T15:03:47.356" v="3681" actId="478"/>
+          <ac:spMkLst>
+            <pc:docMk/>
+            <pc:sldMk cId="4285604835" sldId="262"/>
+            <ac:spMk id="6" creationId="{3862965F-52D8-4BF4-94E4-C13C96FB2346}"/>
+          </ac:spMkLst>
+        </pc:spChg>
+        <pc:spChg chg="del">
+          <ac:chgData name="Fabio Palacio" userId="1994740e-388a-4854-93b3-cd3e145b0191" providerId="ADAL" clId="{F2A46197-B517-466D-BCA9-4F8C8F44B3E1}" dt="2019-07-02T15:03:49.015" v="3683" actId="478"/>
+          <ac:spMkLst>
+            <pc:docMk/>
+            <pc:sldMk cId="4285604835" sldId="262"/>
+            <ac:spMk id="7" creationId="{5B8353A7-26CC-4FC4-AE32-DBCED4F88351}"/>
+          </ac:spMkLst>
+        </pc:spChg>
+        <pc:spChg chg="del mod">
+          <ac:chgData name="Fabio Palacio" userId="1994740e-388a-4854-93b3-cd3e145b0191" providerId="ADAL" clId="{F2A46197-B517-466D-BCA9-4F8C8F44B3E1}" dt="2019-07-02T15:03:49.660" v="3684" actId="478"/>
+          <ac:spMkLst>
+            <pc:docMk/>
+            <pc:sldMk cId="4285604835" sldId="262"/>
+            <ac:spMk id="8" creationId="{87F0DC01-E98D-4BF1-B815-0C75FA3D8BF0}"/>
+          </ac:spMkLst>
+        </pc:spChg>
+        <pc:spChg chg="del">
+          <ac:chgData name="Fabio Palacio" userId="1994740e-388a-4854-93b3-cd3e145b0191" providerId="ADAL" clId="{F2A46197-B517-466D-BCA9-4F8C8F44B3E1}" dt="2019-07-02T15:03:50.467" v="3685" actId="478"/>
+          <ac:spMkLst>
+            <pc:docMk/>
+            <pc:sldMk cId="4285604835" sldId="262"/>
+            <ac:spMk id="9" creationId="{6F61E7D6-851C-4A9B-A9E5-B732E857C084}"/>
+          </ac:spMkLst>
+        </pc:spChg>
+        <pc:spChg chg="add mod">
+          <ac:chgData name="Fabio Palacio" userId="1994740e-388a-4854-93b3-cd3e145b0191" providerId="ADAL" clId="{F2A46197-B517-466D-BCA9-4F8C8F44B3E1}" dt="2019-07-02T14:59:38.628" v="3676" actId="403"/>
+          <ac:spMkLst>
+            <pc:docMk/>
+            <pc:sldMk cId="4285604835" sldId="262"/>
+            <ac:spMk id="10" creationId="{C0173095-62B7-4B05-A95D-EFC0655049C6}"/>
+          </ac:spMkLst>
+        </pc:spChg>
+      </pc:sldChg>
+      <pc:sldChg chg="modSp add">
+        <pc:chgData name="Fabio Palacio" userId="1994740e-388a-4854-93b3-cd3e145b0191" providerId="ADAL" clId="{F2A46197-B517-466D-BCA9-4F8C8F44B3E1}" dt="2019-07-02T15:31:18.790" v="4892" actId="20577"/>
+        <pc:sldMkLst>
+          <pc:docMk/>
+          <pc:sldMk cId="3374671254" sldId="263"/>
+        </pc:sldMkLst>
+        <pc:spChg chg="mod">
+          <ac:chgData name="Fabio Palacio" userId="1994740e-388a-4854-93b3-cd3e145b0191" providerId="ADAL" clId="{F2A46197-B517-466D-BCA9-4F8C8F44B3E1}" dt="2019-07-02T15:31:18.790" v="4892" actId="20577"/>
+          <ac:spMkLst>
+            <pc:docMk/>
+            <pc:sldMk cId="3374671254" sldId="263"/>
+            <ac:spMk id="3" creationId="{96E839CF-DF3C-41E9-A44E-FC7B80BF283F}"/>
+          </ac:spMkLst>
+        </pc:spChg>
+        <pc:spChg chg="mod">
+          <ac:chgData name="Fabio Palacio" userId="1994740e-388a-4854-93b3-cd3e145b0191" providerId="ADAL" clId="{F2A46197-B517-466D-BCA9-4F8C8F44B3E1}" dt="2019-07-02T15:05:00.188" v="3936" actId="207"/>
+          <ac:spMkLst>
+            <pc:docMk/>
+            <pc:sldMk cId="3374671254" sldId="263"/>
+            <ac:spMk id="10" creationId="{C0173095-62B7-4B05-A95D-EFC0655049C6}"/>
+          </ac:spMkLst>
+        </pc:spChg>
       </pc:sldChg>
     </pc:docChg>
   </pc:docChgLst>
@@ -332,7 +856,7 @@
           <a:p>
             <a:fld id="{465BCE93-F76F-4183-A263-68C866C38CE4}" type="datetimeFigureOut">
               <a:rPr lang="en-US" smtClean="0"/>
-              <a:t>6/20/2019</a:t>
+              <a:t>7/2/2019</a:t>
             </a:fld>
             <a:endParaRPr lang="en-US"/>
           </a:p>
@@ -530,7 +1054,7 @@
           <a:p>
             <a:fld id="{465BCE93-F76F-4183-A263-68C866C38CE4}" type="datetimeFigureOut">
               <a:rPr lang="en-US" smtClean="0"/>
-              <a:t>6/20/2019</a:t>
+              <a:t>7/2/2019</a:t>
             </a:fld>
             <a:endParaRPr lang="en-US"/>
           </a:p>
@@ -738,7 +1262,7 @@
           <a:p>
             <a:fld id="{465BCE93-F76F-4183-A263-68C866C38CE4}" type="datetimeFigureOut">
               <a:rPr lang="en-US" smtClean="0"/>
-              <a:t>6/20/2019</a:t>
+              <a:t>7/2/2019</a:t>
             </a:fld>
             <a:endParaRPr lang="en-US"/>
           </a:p>
@@ -936,7 +1460,7 @@
           <a:p>
             <a:fld id="{465BCE93-F76F-4183-A263-68C866C38CE4}" type="datetimeFigureOut">
               <a:rPr lang="en-US" smtClean="0"/>
-              <a:t>6/20/2019</a:t>
+              <a:t>7/2/2019</a:t>
             </a:fld>
             <a:endParaRPr lang="en-US"/>
           </a:p>
@@ -1211,7 +1735,7 @@
           <a:p>
             <a:fld id="{465BCE93-F76F-4183-A263-68C866C38CE4}" type="datetimeFigureOut">
               <a:rPr lang="en-US" smtClean="0"/>
-              <a:t>6/20/2019</a:t>
+              <a:t>7/2/2019</a:t>
             </a:fld>
             <a:endParaRPr lang="en-US"/>
           </a:p>
@@ -1476,7 +2000,7 @@
           <a:p>
             <a:fld id="{465BCE93-F76F-4183-A263-68C866C38CE4}" type="datetimeFigureOut">
               <a:rPr lang="en-US" smtClean="0"/>
-              <a:t>6/20/2019</a:t>
+              <a:t>7/2/2019</a:t>
             </a:fld>
             <a:endParaRPr lang="en-US"/>
           </a:p>
@@ -1888,7 +2412,7 @@
           <a:p>
             <a:fld id="{465BCE93-F76F-4183-A263-68C866C38CE4}" type="datetimeFigureOut">
               <a:rPr lang="en-US" smtClean="0"/>
-              <a:t>6/20/2019</a:t>
+              <a:t>7/2/2019</a:t>
             </a:fld>
             <a:endParaRPr lang="en-US"/>
           </a:p>
@@ -2029,7 +2553,7 @@
           <a:p>
             <a:fld id="{465BCE93-F76F-4183-A263-68C866C38CE4}" type="datetimeFigureOut">
               <a:rPr lang="en-US" smtClean="0"/>
-              <a:t>6/20/2019</a:t>
+              <a:t>7/2/2019</a:t>
             </a:fld>
             <a:endParaRPr lang="en-US"/>
           </a:p>
@@ -2142,7 +2666,7 @@
           <a:p>
             <a:fld id="{465BCE93-F76F-4183-A263-68C866C38CE4}" type="datetimeFigureOut">
               <a:rPr lang="en-US" smtClean="0"/>
-              <a:t>6/20/2019</a:t>
+              <a:t>7/2/2019</a:t>
             </a:fld>
             <a:endParaRPr lang="en-US"/>
           </a:p>
@@ -2453,7 +2977,7 @@
           <a:p>
             <a:fld id="{465BCE93-F76F-4183-A263-68C866C38CE4}" type="datetimeFigureOut">
               <a:rPr lang="en-US" smtClean="0"/>
-              <a:t>6/20/2019</a:t>
+              <a:t>7/2/2019</a:t>
             </a:fld>
             <a:endParaRPr lang="en-US"/>
           </a:p>
@@ -2741,7 +3265,7 @@
           <a:p>
             <a:fld id="{465BCE93-F76F-4183-A263-68C866C38CE4}" type="datetimeFigureOut">
               <a:rPr lang="en-US" smtClean="0"/>
-              <a:t>6/20/2019</a:t>
+              <a:t>7/2/2019</a:t>
             </a:fld>
             <a:endParaRPr lang="en-US"/>
           </a:p>
@@ -2982,7 +3506,7 @@
           <a:p>
             <a:fld id="{465BCE93-F76F-4183-A263-68C866C38CE4}" type="datetimeFigureOut">
               <a:rPr lang="en-US" smtClean="0"/>
-              <a:t>6/20/2019</a:t>
+              <a:t>7/2/2019</a:t>
             </a:fld>
             <a:endParaRPr lang="en-US"/>
           </a:p>
@@ -3481,6 +4005,201 @@
       </p:grpSpPr>
       <p:sp>
         <p:nvSpPr>
+          <p:cNvPr id="2" name="Title 1">
+            <a:extLst>
+              <a:ext uri="{FF2B5EF4-FFF2-40B4-BE49-F238E27FC236}">
+                <a16:creationId xmlns:a16="http://schemas.microsoft.com/office/drawing/2014/main" id="{67A03E4A-E099-4FDC-AA4B-675A24851E05}"/>
+              </a:ext>
+            </a:extLst>
+          </p:cNvPr>
+          <p:cNvSpPr>
+            <a:spLocks noGrp="1"/>
+          </p:cNvSpPr>
+          <p:nvPr>
+            <p:ph type="title"/>
+          </p:nvPr>
+        </p:nvSpPr>
+        <p:spPr/>
+        <p:txBody>
+          <a:bodyPr/>
+          <a:lstStyle/>
+          <a:p>
+            <a:r>
+              <a:rPr lang="en-US" dirty="0"/>
+              <a:t>File Structure : ECCC</a:t>
+            </a:r>
+          </a:p>
+        </p:txBody>
+      </p:sp>
+      <p:sp>
+        <p:nvSpPr>
+          <p:cNvPr id="3" name="Content Placeholder 2">
+            <a:extLst>
+              <a:ext uri="{FF2B5EF4-FFF2-40B4-BE49-F238E27FC236}">
+                <a16:creationId xmlns:a16="http://schemas.microsoft.com/office/drawing/2014/main" id="{3C0F9A91-3557-4651-ABC2-505DB9D4ACC1}"/>
+              </a:ext>
+            </a:extLst>
+          </p:cNvPr>
+          <p:cNvSpPr>
+            <a:spLocks noGrp="1"/>
+          </p:cNvSpPr>
+          <p:nvPr>
+            <p:ph idx="1"/>
+          </p:nvPr>
+        </p:nvSpPr>
+        <p:spPr>
+          <a:xfrm>
+            <a:off x="838200" y="1739764"/>
+            <a:ext cx="10515600" cy="4351338"/>
+          </a:xfrm>
+        </p:spPr>
+        <p:txBody>
+          <a:bodyPr>
+            <a:normAutofit/>
+          </a:bodyPr>
+          <a:lstStyle/>
+          <a:p>
+            <a:r>
+              <a:rPr lang="en-US" u="sng" dirty="0"/>
+              <a:t>Code</a:t>
+            </a:r>
+            <a:r>
+              <a:rPr lang="en-US" dirty="0"/>
+              <a:t> – all </a:t>
+            </a:r>
+            <a:r>
+              <a:rPr lang="en-US" dirty="0" err="1"/>
+              <a:t>Rcode</a:t>
+            </a:r>
+            <a:r>
+              <a:rPr lang="en-US" dirty="0"/>
+              <a:t> files</a:t>
+            </a:r>
+          </a:p>
+          <a:p>
+            <a:pPr lvl="1">
+              <a:buFont typeface="Courier New" panose="02070309020205020404" pitchFamily="49" charset="0"/>
+              <a:buChar char="o"/>
+            </a:pPr>
+            <a:r>
+              <a:rPr lang="en-US" dirty="0"/>
+              <a:t>Functions – core functions</a:t>
+            </a:r>
+          </a:p>
+          <a:p>
+            <a:r>
+              <a:rPr lang="en-US" u="sng" dirty="0"/>
+              <a:t>Outputs</a:t>
+            </a:r>
+            <a:r>
+              <a:rPr lang="en-US" dirty="0"/>
+              <a:t> – all outputs (csv and </a:t>
+            </a:r>
+            <a:r>
+              <a:rPr lang="en-US" dirty="0" err="1"/>
+              <a:t>rds</a:t>
+            </a:r>
+            <a:r>
+              <a:rPr lang="en-US" dirty="0"/>
+              <a:t> formats). CSVs are model-readable</a:t>
+            </a:r>
+          </a:p>
+          <a:p>
+            <a:r>
+              <a:rPr lang="en-US" u="sng" dirty="0"/>
+              <a:t>Resources</a:t>
+            </a:r>
+            <a:r>
+              <a:rPr lang="en-US" dirty="0"/>
+              <a:t> – all inputs, these can be either RDS files or csv/excel</a:t>
+            </a:r>
+          </a:p>
+          <a:p>
+            <a:r>
+              <a:rPr lang="en-US" u="sng" dirty="0"/>
+              <a:t>QA</a:t>
+            </a:r>
+            <a:r>
+              <a:rPr lang="en-US" dirty="0"/>
+              <a:t> – this holds the QA program</a:t>
+            </a:r>
+          </a:p>
+          <a:p>
+            <a:pPr lvl="1"/>
+            <a:r>
+              <a:rPr lang="en-US" dirty="0"/>
+              <a:t>Code – </a:t>
+            </a:r>
+            <a:r>
+              <a:rPr lang="en-US" dirty="0" err="1"/>
+              <a:t>Rcode</a:t>
+            </a:r>
+            <a:r>
+              <a:rPr lang="en-US" dirty="0"/>
+              <a:t> files</a:t>
+            </a:r>
+          </a:p>
+          <a:p>
+            <a:pPr lvl="1"/>
+            <a:r>
+              <a:rPr lang="en-US" dirty="0"/>
+              <a:t>Outputs – QA outputs</a:t>
+            </a:r>
+          </a:p>
+          <a:p>
+            <a:r>
+              <a:rPr lang="en-US" u="sng" dirty="0"/>
+              <a:t>Documentation</a:t>
+            </a:r>
+            <a:r>
+              <a:rPr lang="en-US" dirty="0"/>
+              <a:t> – PPT files</a:t>
+            </a:r>
+          </a:p>
+          <a:p>
+            <a:r>
+              <a:rPr lang="en-US" u="sng" dirty="0"/>
+              <a:t>2007 base </a:t>
+            </a:r>
+            <a:r>
+              <a:rPr lang="en-US" dirty="0"/>
+              <a:t>– all the associated files just before rebasing</a:t>
+            </a:r>
+          </a:p>
+        </p:txBody>
+      </p:sp>
+    </p:spTree>
+    <p:extLst>
+      <p:ext uri="{BB962C8B-B14F-4D97-AF65-F5344CB8AC3E}">
+        <p14:creationId xmlns:p14="http://schemas.microsoft.com/office/powerpoint/2010/main" val="414697160"/>
+      </p:ext>
+    </p:extLst>
+  </p:cSld>
+  <p:clrMapOvr>
+    <a:masterClrMapping/>
+  </p:clrMapOvr>
+</p:sld>
+</file>
+
+<file path=ppt/slides/slide3.xml><?xml version="1.0" encoding="utf-8"?>
+<p:sld xmlns:a="http://schemas.openxmlformats.org/drawingml/2006/main" xmlns:r="http://schemas.openxmlformats.org/officeDocument/2006/relationships" xmlns:p="http://schemas.openxmlformats.org/presentationml/2006/main">
+  <p:cSld>
+    <p:spTree>
+      <p:nvGrpSpPr>
+        <p:cNvPr id="1" name=""/>
+        <p:cNvGrpSpPr/>
+        <p:nvPr/>
+      </p:nvGrpSpPr>
+      <p:grpSpPr>
+        <a:xfrm>
+          <a:off x="0" y="0"/>
+          <a:ext cx="0" cy="0"/>
+          <a:chOff x="0" y="0"/>
+          <a:chExt cx="0" cy="0"/>
+        </a:xfrm>
+      </p:grpSpPr>
+      <p:sp>
+        <p:nvSpPr>
           <p:cNvPr id="4" name="Rectangle 3">
             <a:extLst>
               <a:ext uri="{FF2B5EF4-FFF2-40B4-BE49-F238E27FC236}">
@@ -4044,10 +4763,10 @@
       </p:sp>
       <p:sp>
         <p:nvSpPr>
-          <p:cNvPr id="21" name="Rectangle 20">
-            <a:extLst>
-              <a:ext uri="{FF2B5EF4-FFF2-40B4-BE49-F238E27FC236}">
-                <a16:creationId xmlns:a16="http://schemas.microsoft.com/office/drawing/2014/main" id="{30581ACC-F690-44D9-AA40-31A781F9D9EB}"/>
+          <p:cNvPr id="22" name="Rectangle 21">
+            <a:extLst>
+              <a:ext uri="{FF2B5EF4-FFF2-40B4-BE49-F238E27FC236}">
+                <a16:creationId xmlns:a16="http://schemas.microsoft.com/office/drawing/2014/main" id="{DFC248A5-F583-4B1F-948B-62D7A10F608F}"/>
               </a:ext>
             </a:extLst>
           </p:cNvPr>
@@ -4056,8 +4775,8 @@
         </p:nvSpPr>
         <p:spPr>
           <a:xfrm>
-            <a:off x="9855323" y="1259187"/>
-            <a:ext cx="2258191" cy="887240"/>
+            <a:off x="10110627" y="3822023"/>
+            <a:ext cx="1866735" cy="479660"/>
           </a:xfrm>
           <a:prstGeom prst="rect">
             <a:avLst/>
@@ -4089,59 +4808,6 @@
             <a:pPr algn="ctr"/>
             <a:r>
               <a:rPr lang="en-US" dirty="0" err="1"/>
-              <a:t>imposegrowthrates</a:t>
-            </a:r>
-            <a:endParaRPr lang="en-US" dirty="0"/>
-          </a:p>
-        </p:txBody>
-      </p:sp>
-      <p:sp>
-        <p:nvSpPr>
-          <p:cNvPr id="22" name="Rectangle 21">
-            <a:extLst>
-              <a:ext uri="{FF2B5EF4-FFF2-40B4-BE49-F238E27FC236}">
-                <a16:creationId xmlns:a16="http://schemas.microsoft.com/office/drawing/2014/main" id="{DFC248A5-F583-4B1F-948B-62D7A10F608F}"/>
-              </a:ext>
-            </a:extLst>
-          </p:cNvPr>
-          <p:cNvSpPr/>
-          <p:nvPr/>
-        </p:nvSpPr>
-        <p:spPr>
-          <a:xfrm>
-            <a:off x="9855324" y="2537233"/>
-            <a:ext cx="2258191" cy="887240"/>
-          </a:xfrm>
-          <a:prstGeom prst="rect">
-            <a:avLst/>
-          </a:prstGeom>
-          <a:solidFill>
-            <a:schemeClr val="accent2"/>
-          </a:solidFill>
-        </p:spPr>
-        <p:style>
-          <a:lnRef idx="2">
-            <a:schemeClr val="accent1">
-              <a:shade val="50000"/>
-            </a:schemeClr>
-          </a:lnRef>
-          <a:fillRef idx="1">
-            <a:schemeClr val="accent1"/>
-          </a:fillRef>
-          <a:effectRef idx="0">
-            <a:schemeClr val="accent1"/>
-          </a:effectRef>
-          <a:fontRef idx="minor">
-            <a:schemeClr val="lt1"/>
-          </a:fontRef>
-        </p:style>
-        <p:txBody>
-          <a:bodyPr rtlCol="0" anchor="ctr"/>
-          <a:lstStyle/>
-          <a:p>
-            <a:pPr algn="ctr"/>
-            <a:r>
-              <a:rPr lang="en-US" dirty="0" err="1"/>
               <a:t>verthortieup</a:t>
             </a:r>
             <a:endParaRPr lang="en-US" dirty="0"/>
@@ -4158,6 +4824,7 @@
             </a:extLst>
           </p:cNvPr>
           <p:cNvCxnSpPr>
+            <a:cxnSpLocks/>
             <a:stCxn id="22" idx="1"/>
             <a:endCxn id="20" idx="3"/>
           </p:cNvCxnSpPr>
@@ -4166,7 +4833,7 @@
         <p:spPr>
           <a:xfrm flipH="1" flipV="1">
             <a:off x="6339160" y="1932161"/>
-            <a:ext cx="3516164" cy="1048692"/>
+            <a:ext cx="3771467" cy="2129692"/>
           </a:xfrm>
           <a:prstGeom prst="line">
             <a:avLst/>
@@ -4198,14 +4865,15 @@
           </p:cNvPr>
           <p:cNvCxnSpPr>
             <a:cxnSpLocks/>
-            <a:stCxn id="21" idx="1"/>
+            <a:stCxn id="38" idx="1"/>
+            <a:endCxn id="20" idx="3"/>
           </p:cNvCxnSpPr>
           <p:nvPr/>
         </p:nvCxnSpPr>
         <p:spPr>
-          <a:xfrm flipH="1">
-            <a:off x="6339147" y="1702807"/>
-            <a:ext cx="3516176" cy="3206"/>
+          <a:xfrm flipH="1" flipV="1">
+            <a:off x="6339160" y="1932161"/>
+            <a:ext cx="3771467" cy="1582256"/>
           </a:xfrm>
           <a:prstGeom prst="line">
             <a:avLst/>
@@ -4240,8 +4908,8 @@
         </p:nvSpPr>
         <p:spPr>
           <a:xfrm>
-            <a:off x="9855336" y="4253620"/>
-            <a:ext cx="2258191" cy="887240"/>
+            <a:off x="10110652" y="4458789"/>
+            <a:ext cx="1866722" cy="476902"/>
           </a:xfrm>
           <a:prstGeom prst="rect">
             <a:avLst/>
@@ -4288,6 +4956,7 @@
             </a:extLst>
           </p:cNvPr>
           <p:cNvCxnSpPr>
+            <a:cxnSpLocks/>
             <a:stCxn id="28" idx="1"/>
             <a:endCxn id="17" idx="3"/>
           </p:cNvCxnSpPr>
@@ -4296,7 +4965,7 @@
         <p:spPr>
           <a:xfrm flipH="1" flipV="1">
             <a:off x="6339160" y="4697239"/>
-            <a:ext cx="3516176" cy="1"/>
+            <a:ext cx="3771492" cy="1"/>
           </a:xfrm>
           <a:prstGeom prst="line">
             <a:avLst/>
@@ -4962,10 +5631,2768 @@
           </a:fontRef>
         </p:style>
       </p:cxnSp>
+      <p:sp>
+        <p:nvSpPr>
+          <p:cNvPr id="38" name="Rectangle 37">
+            <a:extLst>
+              <a:ext uri="{FF2B5EF4-FFF2-40B4-BE49-F238E27FC236}">
+                <a16:creationId xmlns:a16="http://schemas.microsoft.com/office/drawing/2014/main" id="{17F27E98-A45B-4763-8AB0-1E4A695CE526}"/>
+              </a:ext>
+            </a:extLst>
+          </p:cNvPr>
+          <p:cNvSpPr/>
+          <p:nvPr/>
+        </p:nvSpPr>
+        <p:spPr>
+          <a:xfrm>
+            <a:off x="10110627" y="3274587"/>
+            <a:ext cx="1866735" cy="479660"/>
+          </a:xfrm>
+          <a:prstGeom prst="rect">
+            <a:avLst/>
+          </a:prstGeom>
+          <a:solidFill>
+            <a:schemeClr val="accent2"/>
+          </a:solidFill>
+        </p:spPr>
+        <p:style>
+          <a:lnRef idx="2">
+            <a:schemeClr val="accent1">
+              <a:shade val="50000"/>
+            </a:schemeClr>
+          </a:lnRef>
+          <a:fillRef idx="1">
+            <a:schemeClr val="accent1"/>
+          </a:fillRef>
+          <a:effectRef idx="0">
+            <a:schemeClr val="accent1"/>
+          </a:effectRef>
+          <a:fontRef idx="minor">
+            <a:schemeClr val="lt1"/>
+          </a:fontRef>
+        </p:style>
+        <p:txBody>
+          <a:bodyPr rtlCol="0" anchor="ctr"/>
+          <a:lstStyle/>
+          <a:p>
+            <a:pPr algn="ctr"/>
+            <a:r>
+              <a:rPr lang="en-US" sz="1400" dirty="0" err="1"/>
+              <a:t>imposegrowthrates</a:t>
+            </a:r>
+            <a:endParaRPr lang="en-US" sz="1400" dirty="0"/>
+          </a:p>
+        </p:txBody>
+      </p:sp>
+      <p:sp>
+        <p:nvSpPr>
+          <p:cNvPr id="40" name="Rectangle 39">
+            <a:extLst>
+              <a:ext uri="{FF2B5EF4-FFF2-40B4-BE49-F238E27FC236}">
+                <a16:creationId xmlns:a16="http://schemas.microsoft.com/office/drawing/2014/main" id="{43FCF595-3217-4AA3-B18D-D701CF72792B}"/>
+              </a:ext>
+            </a:extLst>
+          </p:cNvPr>
+          <p:cNvSpPr/>
+          <p:nvPr/>
+        </p:nvSpPr>
+        <p:spPr>
+          <a:xfrm>
+            <a:off x="10110640" y="2066302"/>
+            <a:ext cx="1866748" cy="479660"/>
+          </a:xfrm>
+          <a:prstGeom prst="rect">
+            <a:avLst/>
+          </a:prstGeom>
+          <a:solidFill>
+            <a:schemeClr val="accent2"/>
+          </a:solidFill>
+        </p:spPr>
+        <p:style>
+          <a:lnRef idx="2">
+            <a:schemeClr val="accent1">
+              <a:shade val="50000"/>
+            </a:schemeClr>
+          </a:lnRef>
+          <a:fillRef idx="1">
+            <a:schemeClr val="accent1"/>
+          </a:fillRef>
+          <a:effectRef idx="0">
+            <a:schemeClr val="accent1"/>
+          </a:effectRef>
+          <a:fontRef idx="minor">
+            <a:schemeClr val="lt1"/>
+          </a:fontRef>
+        </p:style>
+        <p:txBody>
+          <a:bodyPr rtlCol="0" anchor="ctr"/>
+          <a:lstStyle/>
+          <a:p>
+            <a:pPr algn="ctr"/>
+            <a:r>
+              <a:rPr lang="en-US" sz="1200" dirty="0" err="1"/>
+              <a:t>Merge_data_meta</a:t>
+            </a:r>
+            <a:endParaRPr lang="en-US" sz="1200" dirty="0"/>
+          </a:p>
+        </p:txBody>
+      </p:sp>
+      <p:cxnSp>
+        <p:nvCxnSpPr>
+          <p:cNvPr id="45" name="Straight Connector 44">
+            <a:extLst>
+              <a:ext uri="{FF2B5EF4-FFF2-40B4-BE49-F238E27FC236}">
+                <a16:creationId xmlns:a16="http://schemas.microsoft.com/office/drawing/2014/main" id="{8F2F340B-2404-44AE-A119-74695BE88285}"/>
+              </a:ext>
+            </a:extLst>
+          </p:cNvPr>
+          <p:cNvCxnSpPr>
+            <a:cxnSpLocks/>
+            <a:stCxn id="40" idx="1"/>
+            <a:endCxn id="15" idx="3"/>
+          </p:cNvCxnSpPr>
+          <p:nvPr/>
+        </p:nvCxnSpPr>
+        <p:spPr>
+          <a:xfrm flipH="1" flipV="1">
+            <a:off x="6339160" y="778598"/>
+            <a:ext cx="3771480" cy="1527534"/>
+          </a:xfrm>
+          <a:prstGeom prst="line">
+            <a:avLst/>
+          </a:prstGeom>
+        </p:spPr>
+        <p:style>
+          <a:lnRef idx="1">
+            <a:schemeClr val="accent1"/>
+          </a:lnRef>
+          <a:fillRef idx="0">
+            <a:schemeClr val="accent1"/>
+          </a:fillRef>
+          <a:effectRef idx="0">
+            <a:schemeClr val="accent1"/>
+          </a:effectRef>
+          <a:fontRef idx="minor">
+            <a:schemeClr val="tx1"/>
+          </a:fontRef>
+        </p:style>
+      </p:cxnSp>
+      <p:sp>
+        <p:nvSpPr>
+          <p:cNvPr id="46" name="Rectangle 45">
+            <a:extLst>
+              <a:ext uri="{FF2B5EF4-FFF2-40B4-BE49-F238E27FC236}">
+                <a16:creationId xmlns:a16="http://schemas.microsoft.com/office/drawing/2014/main" id="{E7DBAA14-D028-4304-869D-1AD6C60ED370}"/>
+              </a:ext>
+            </a:extLst>
+          </p:cNvPr>
+          <p:cNvSpPr/>
+          <p:nvPr/>
+        </p:nvSpPr>
+        <p:spPr>
+          <a:xfrm>
+            <a:off x="10110640" y="1547255"/>
+            <a:ext cx="1866748" cy="479660"/>
+          </a:xfrm>
+          <a:prstGeom prst="rect">
+            <a:avLst/>
+          </a:prstGeom>
+          <a:solidFill>
+            <a:schemeClr val="accent2"/>
+          </a:solidFill>
+        </p:spPr>
+        <p:style>
+          <a:lnRef idx="2">
+            <a:schemeClr val="accent1">
+              <a:shade val="50000"/>
+            </a:schemeClr>
+          </a:lnRef>
+          <a:fillRef idx="1">
+            <a:schemeClr val="accent1"/>
+          </a:fillRef>
+          <a:effectRef idx="0">
+            <a:schemeClr val="accent1"/>
+          </a:effectRef>
+          <a:fontRef idx="minor">
+            <a:schemeClr val="lt1"/>
+          </a:fontRef>
+        </p:style>
+        <p:txBody>
+          <a:bodyPr rtlCol="0" anchor="ctr"/>
+          <a:lstStyle/>
+          <a:p>
+            <a:pPr algn="ctr"/>
+            <a:r>
+              <a:rPr lang="en-US" sz="1200" dirty="0" err="1"/>
+              <a:t>Clean_metadata_outputs</a:t>
+            </a:r>
+            <a:endParaRPr lang="en-US" sz="1200" dirty="0"/>
+          </a:p>
+        </p:txBody>
+      </p:sp>
+      <p:cxnSp>
+        <p:nvCxnSpPr>
+          <p:cNvPr id="47" name="Straight Connector 46">
+            <a:extLst>
+              <a:ext uri="{FF2B5EF4-FFF2-40B4-BE49-F238E27FC236}">
+                <a16:creationId xmlns:a16="http://schemas.microsoft.com/office/drawing/2014/main" id="{B2880E58-2C6C-4EFA-9DA9-C9FB3707428F}"/>
+              </a:ext>
+            </a:extLst>
+          </p:cNvPr>
+          <p:cNvCxnSpPr>
+            <a:cxnSpLocks/>
+            <a:stCxn id="46" idx="1"/>
+            <a:endCxn id="15" idx="3"/>
+          </p:cNvCxnSpPr>
+          <p:nvPr/>
+        </p:nvCxnSpPr>
+        <p:spPr>
+          <a:xfrm flipH="1" flipV="1">
+            <a:off x="6339160" y="778598"/>
+            <a:ext cx="3771480" cy="1008487"/>
+          </a:xfrm>
+          <a:prstGeom prst="line">
+            <a:avLst/>
+          </a:prstGeom>
+        </p:spPr>
+        <p:style>
+          <a:lnRef idx="1">
+            <a:schemeClr val="accent1"/>
+          </a:lnRef>
+          <a:fillRef idx="0">
+            <a:schemeClr val="accent1"/>
+          </a:fillRef>
+          <a:effectRef idx="0">
+            <a:schemeClr val="accent1"/>
+          </a:effectRef>
+          <a:fontRef idx="minor">
+            <a:schemeClr val="tx1"/>
+          </a:fontRef>
+        </p:style>
+      </p:cxnSp>
+      <p:sp>
+        <p:nvSpPr>
+          <p:cNvPr id="48" name="Rectangle 47">
+            <a:extLst>
+              <a:ext uri="{FF2B5EF4-FFF2-40B4-BE49-F238E27FC236}">
+                <a16:creationId xmlns:a16="http://schemas.microsoft.com/office/drawing/2014/main" id="{2FB4CFB8-8F97-4492-96FF-00DBA4DB802D}"/>
+              </a:ext>
+            </a:extLst>
+          </p:cNvPr>
+          <p:cNvSpPr/>
+          <p:nvPr/>
+        </p:nvSpPr>
+        <p:spPr>
+          <a:xfrm>
+            <a:off x="10110640" y="1050247"/>
+            <a:ext cx="1866748" cy="479660"/>
+          </a:xfrm>
+          <a:prstGeom prst="rect">
+            <a:avLst/>
+          </a:prstGeom>
+          <a:solidFill>
+            <a:schemeClr val="accent2"/>
+          </a:solidFill>
+        </p:spPr>
+        <p:style>
+          <a:lnRef idx="2">
+            <a:schemeClr val="accent1">
+              <a:shade val="50000"/>
+            </a:schemeClr>
+          </a:lnRef>
+          <a:fillRef idx="1">
+            <a:schemeClr val="accent1"/>
+          </a:fillRef>
+          <a:effectRef idx="0">
+            <a:schemeClr val="accent1"/>
+          </a:effectRef>
+          <a:fontRef idx="minor">
+            <a:schemeClr val="lt1"/>
+          </a:fontRef>
+        </p:style>
+        <p:txBody>
+          <a:bodyPr rtlCol="0" anchor="ctr"/>
+          <a:lstStyle/>
+          <a:p>
+            <a:pPr algn="ctr"/>
+            <a:r>
+              <a:rPr lang="en-US" sz="1200" dirty="0" err="1"/>
+              <a:t>Download_metadata_pID</a:t>
+            </a:r>
+            <a:endParaRPr lang="en-US" sz="1200" dirty="0"/>
+          </a:p>
+        </p:txBody>
+      </p:sp>
+      <p:cxnSp>
+        <p:nvCxnSpPr>
+          <p:cNvPr id="49" name="Straight Connector 48">
+            <a:extLst>
+              <a:ext uri="{FF2B5EF4-FFF2-40B4-BE49-F238E27FC236}">
+                <a16:creationId xmlns:a16="http://schemas.microsoft.com/office/drawing/2014/main" id="{45579E44-CCEC-4A9A-A54C-8D7223C0ED36}"/>
+              </a:ext>
+            </a:extLst>
+          </p:cNvPr>
+          <p:cNvCxnSpPr>
+            <a:cxnSpLocks/>
+            <a:stCxn id="48" idx="1"/>
+            <a:endCxn id="15" idx="3"/>
+          </p:cNvCxnSpPr>
+          <p:nvPr/>
+        </p:nvCxnSpPr>
+        <p:spPr>
+          <a:xfrm flipH="1" flipV="1">
+            <a:off x="6339160" y="778598"/>
+            <a:ext cx="3771480" cy="511479"/>
+          </a:xfrm>
+          <a:prstGeom prst="line">
+            <a:avLst/>
+          </a:prstGeom>
+        </p:spPr>
+        <p:style>
+          <a:lnRef idx="1">
+            <a:schemeClr val="accent1"/>
+          </a:lnRef>
+          <a:fillRef idx="0">
+            <a:schemeClr val="accent1"/>
+          </a:fillRef>
+          <a:effectRef idx="0">
+            <a:schemeClr val="accent1"/>
+          </a:effectRef>
+          <a:fontRef idx="minor">
+            <a:schemeClr val="tx1"/>
+          </a:fontRef>
+        </p:style>
+      </p:cxnSp>
+      <p:sp>
+        <p:nvSpPr>
+          <p:cNvPr id="54" name="Rectangle 53">
+            <a:extLst>
+              <a:ext uri="{FF2B5EF4-FFF2-40B4-BE49-F238E27FC236}">
+                <a16:creationId xmlns:a16="http://schemas.microsoft.com/office/drawing/2014/main" id="{0292E884-0F43-45AE-A025-053A0CA35180}"/>
+              </a:ext>
+            </a:extLst>
+          </p:cNvPr>
+          <p:cNvSpPr/>
+          <p:nvPr/>
+        </p:nvSpPr>
+        <p:spPr>
+          <a:xfrm>
+            <a:off x="10110640" y="549192"/>
+            <a:ext cx="1866748" cy="479660"/>
+          </a:xfrm>
+          <a:prstGeom prst="rect">
+            <a:avLst/>
+          </a:prstGeom>
+          <a:solidFill>
+            <a:schemeClr val="accent2"/>
+          </a:solidFill>
+        </p:spPr>
+        <p:style>
+          <a:lnRef idx="2">
+            <a:schemeClr val="accent1">
+              <a:shade val="50000"/>
+            </a:schemeClr>
+          </a:lnRef>
+          <a:fillRef idx="1">
+            <a:schemeClr val="accent1"/>
+          </a:fillRef>
+          <a:effectRef idx="0">
+            <a:schemeClr val="accent1"/>
+          </a:effectRef>
+          <a:fontRef idx="minor">
+            <a:schemeClr val="lt1"/>
+          </a:fontRef>
+        </p:style>
+        <p:txBody>
+          <a:bodyPr rtlCol="0" anchor="ctr"/>
+          <a:lstStyle/>
+          <a:p>
+            <a:pPr algn="ctr"/>
+            <a:r>
+              <a:rPr lang="en-US" sz="1200" dirty="0" err="1"/>
+              <a:t>Clean_data_outputs</a:t>
+            </a:r>
+            <a:endParaRPr lang="en-US" sz="1200" dirty="0"/>
+          </a:p>
+        </p:txBody>
+      </p:sp>
+      <p:cxnSp>
+        <p:nvCxnSpPr>
+          <p:cNvPr id="55" name="Straight Connector 54">
+            <a:extLst>
+              <a:ext uri="{FF2B5EF4-FFF2-40B4-BE49-F238E27FC236}">
+                <a16:creationId xmlns:a16="http://schemas.microsoft.com/office/drawing/2014/main" id="{947A0BD8-3C19-41BA-B29A-38C79809BB29}"/>
+              </a:ext>
+            </a:extLst>
+          </p:cNvPr>
+          <p:cNvCxnSpPr>
+            <a:cxnSpLocks/>
+            <a:stCxn id="54" idx="1"/>
+            <a:endCxn id="15" idx="3"/>
+          </p:cNvCxnSpPr>
+          <p:nvPr/>
+        </p:nvCxnSpPr>
+        <p:spPr>
+          <a:xfrm flipH="1" flipV="1">
+            <a:off x="6339160" y="778598"/>
+            <a:ext cx="3771480" cy="10424"/>
+          </a:xfrm>
+          <a:prstGeom prst="line">
+            <a:avLst/>
+          </a:prstGeom>
+        </p:spPr>
+        <p:style>
+          <a:lnRef idx="1">
+            <a:schemeClr val="accent1"/>
+          </a:lnRef>
+          <a:fillRef idx="0">
+            <a:schemeClr val="accent1"/>
+          </a:fillRef>
+          <a:effectRef idx="0">
+            <a:schemeClr val="accent1"/>
+          </a:effectRef>
+          <a:fontRef idx="minor">
+            <a:schemeClr val="tx1"/>
+          </a:fontRef>
+        </p:style>
+      </p:cxnSp>
+      <p:sp>
+        <p:nvSpPr>
+          <p:cNvPr id="58" name="Rectangle 57">
+            <a:extLst>
+              <a:ext uri="{FF2B5EF4-FFF2-40B4-BE49-F238E27FC236}">
+                <a16:creationId xmlns:a16="http://schemas.microsoft.com/office/drawing/2014/main" id="{8AF01FF0-60A6-43DA-A5D2-269C118B7E4E}"/>
+              </a:ext>
+            </a:extLst>
+          </p:cNvPr>
+          <p:cNvSpPr/>
+          <p:nvPr/>
+        </p:nvSpPr>
+        <p:spPr>
+          <a:xfrm>
+            <a:off x="10110627" y="40008"/>
+            <a:ext cx="1866748" cy="479660"/>
+          </a:xfrm>
+          <a:prstGeom prst="rect">
+            <a:avLst/>
+          </a:prstGeom>
+          <a:solidFill>
+            <a:schemeClr val="accent2"/>
+          </a:solidFill>
+        </p:spPr>
+        <p:style>
+          <a:lnRef idx="2">
+            <a:schemeClr val="accent1">
+              <a:shade val="50000"/>
+            </a:schemeClr>
+          </a:lnRef>
+          <a:fillRef idx="1">
+            <a:schemeClr val="accent1"/>
+          </a:fillRef>
+          <a:effectRef idx="0">
+            <a:schemeClr val="accent1"/>
+          </a:effectRef>
+          <a:fontRef idx="minor">
+            <a:schemeClr val="lt1"/>
+          </a:fontRef>
+        </p:style>
+        <p:txBody>
+          <a:bodyPr rtlCol="0" anchor="ctr"/>
+          <a:lstStyle/>
+          <a:p>
+            <a:pPr algn="ctr"/>
+            <a:r>
+              <a:rPr lang="en-US" sz="1200" dirty="0" err="1"/>
+              <a:t>Download_data</a:t>
+            </a:r>
+            <a:endParaRPr lang="en-US" sz="1200" dirty="0"/>
+          </a:p>
+        </p:txBody>
+      </p:sp>
+      <p:cxnSp>
+        <p:nvCxnSpPr>
+          <p:cNvPr id="59" name="Straight Connector 58">
+            <a:extLst>
+              <a:ext uri="{FF2B5EF4-FFF2-40B4-BE49-F238E27FC236}">
+                <a16:creationId xmlns:a16="http://schemas.microsoft.com/office/drawing/2014/main" id="{A7A8977E-9BF3-474B-8569-B4042810E14A}"/>
+              </a:ext>
+            </a:extLst>
+          </p:cNvPr>
+          <p:cNvCxnSpPr>
+            <a:cxnSpLocks/>
+            <a:stCxn id="58" idx="1"/>
+            <a:endCxn id="15" idx="3"/>
+          </p:cNvCxnSpPr>
+          <p:nvPr/>
+        </p:nvCxnSpPr>
+        <p:spPr>
+          <a:xfrm flipH="1">
+            <a:off x="6339160" y="279838"/>
+            <a:ext cx="3771467" cy="498760"/>
+          </a:xfrm>
+          <a:prstGeom prst="line">
+            <a:avLst/>
+          </a:prstGeom>
+        </p:spPr>
+        <p:style>
+          <a:lnRef idx="1">
+            <a:schemeClr val="accent1"/>
+          </a:lnRef>
+          <a:fillRef idx="0">
+            <a:schemeClr val="accent1"/>
+          </a:fillRef>
+          <a:effectRef idx="0">
+            <a:schemeClr val="accent1"/>
+          </a:effectRef>
+          <a:fontRef idx="minor">
+            <a:schemeClr val="tx1"/>
+          </a:fontRef>
+        </p:style>
+      </p:cxnSp>
+      <p:sp>
+        <p:nvSpPr>
+          <p:cNvPr id="71" name="Rectangle 70">
+            <a:extLst>
+              <a:ext uri="{FF2B5EF4-FFF2-40B4-BE49-F238E27FC236}">
+                <a16:creationId xmlns:a16="http://schemas.microsoft.com/office/drawing/2014/main" id="{762A7A67-5C13-4E1E-AD23-FA5C3CE25A39}"/>
+              </a:ext>
+            </a:extLst>
+          </p:cNvPr>
+          <p:cNvSpPr/>
+          <p:nvPr/>
+        </p:nvSpPr>
+        <p:spPr>
+          <a:xfrm>
+            <a:off x="10110627" y="2574963"/>
+            <a:ext cx="1866748" cy="479660"/>
+          </a:xfrm>
+          <a:prstGeom prst="rect">
+            <a:avLst/>
+          </a:prstGeom>
+          <a:solidFill>
+            <a:schemeClr val="accent2"/>
+          </a:solidFill>
+        </p:spPr>
+        <p:style>
+          <a:lnRef idx="2">
+            <a:schemeClr val="accent1">
+              <a:shade val="50000"/>
+            </a:schemeClr>
+          </a:lnRef>
+          <a:fillRef idx="1">
+            <a:schemeClr val="accent1"/>
+          </a:fillRef>
+          <a:effectRef idx="0">
+            <a:schemeClr val="accent1"/>
+          </a:effectRef>
+          <a:fontRef idx="minor">
+            <a:schemeClr val="lt1"/>
+          </a:fontRef>
+        </p:style>
+        <p:txBody>
+          <a:bodyPr rtlCol="0" anchor="ctr"/>
+          <a:lstStyle/>
+          <a:p>
+            <a:pPr algn="ctr"/>
+            <a:r>
+              <a:rPr lang="en-US" sz="1200" dirty="0" err="1"/>
+              <a:t>Final_cleaning</a:t>
+            </a:r>
+            <a:endParaRPr lang="en-US" sz="1200" dirty="0"/>
+          </a:p>
+        </p:txBody>
+      </p:sp>
+      <p:cxnSp>
+        <p:nvCxnSpPr>
+          <p:cNvPr id="72" name="Straight Connector 71">
+            <a:extLst>
+              <a:ext uri="{FF2B5EF4-FFF2-40B4-BE49-F238E27FC236}">
+                <a16:creationId xmlns:a16="http://schemas.microsoft.com/office/drawing/2014/main" id="{6DE7C603-D731-4BD2-BE0A-0DC38ED0AB40}"/>
+              </a:ext>
+            </a:extLst>
+          </p:cNvPr>
+          <p:cNvCxnSpPr>
+            <a:cxnSpLocks/>
+            <a:stCxn id="71" idx="1"/>
+            <a:endCxn id="15" idx="3"/>
+          </p:cNvCxnSpPr>
+          <p:nvPr/>
+        </p:nvCxnSpPr>
+        <p:spPr>
+          <a:xfrm flipH="1" flipV="1">
+            <a:off x="6339160" y="778598"/>
+            <a:ext cx="3771467" cy="2036195"/>
+          </a:xfrm>
+          <a:prstGeom prst="line">
+            <a:avLst/>
+          </a:prstGeom>
+        </p:spPr>
+        <p:style>
+          <a:lnRef idx="1">
+            <a:schemeClr val="accent1"/>
+          </a:lnRef>
+          <a:fillRef idx="0">
+            <a:schemeClr val="accent1"/>
+          </a:fillRef>
+          <a:effectRef idx="0">
+            <a:schemeClr val="accent1"/>
+          </a:effectRef>
+          <a:fontRef idx="minor">
+            <a:schemeClr val="tx1"/>
+          </a:fontRef>
+        </p:style>
+      </p:cxnSp>
+      <p:sp>
+        <p:nvSpPr>
+          <p:cNvPr id="74" name="Rectangle 73">
+            <a:extLst>
+              <a:ext uri="{FF2B5EF4-FFF2-40B4-BE49-F238E27FC236}">
+                <a16:creationId xmlns:a16="http://schemas.microsoft.com/office/drawing/2014/main" id="{C54AEFDC-F8C0-4AA3-A3F0-C0C163E8B1B0}"/>
+              </a:ext>
+            </a:extLst>
+          </p:cNvPr>
+          <p:cNvSpPr/>
+          <p:nvPr/>
+        </p:nvSpPr>
+        <p:spPr>
+          <a:xfrm>
+            <a:off x="775576" y="698721"/>
+            <a:ext cx="2372066" cy="479660"/>
+          </a:xfrm>
+          <a:prstGeom prst="rect">
+            <a:avLst/>
+          </a:prstGeom>
+          <a:solidFill>
+            <a:schemeClr val="accent4">
+              <a:lumMod val="20000"/>
+              <a:lumOff val="80000"/>
+            </a:schemeClr>
+          </a:solidFill>
+          <a:ln>
+            <a:solidFill>
+              <a:schemeClr val="tx1"/>
+            </a:solidFill>
+          </a:ln>
+        </p:spPr>
+        <p:style>
+          <a:lnRef idx="2">
+            <a:schemeClr val="accent1">
+              <a:shade val="50000"/>
+            </a:schemeClr>
+          </a:lnRef>
+          <a:fillRef idx="1">
+            <a:schemeClr val="accent1"/>
+          </a:fillRef>
+          <a:effectRef idx="0">
+            <a:schemeClr val="accent1"/>
+          </a:effectRef>
+          <a:fontRef idx="minor">
+            <a:schemeClr val="lt1"/>
+          </a:fontRef>
+        </p:style>
+        <p:txBody>
+          <a:bodyPr rtlCol="0" anchor="ctr"/>
+          <a:lstStyle/>
+          <a:p>
+            <a:pPr algn="ctr"/>
+            <a:r>
+              <a:rPr lang="en-US" dirty="0">
+                <a:solidFill>
+                  <a:sysClr val="windowText" lastClr="000000"/>
+                </a:solidFill>
+              </a:rPr>
+              <a:t>DataWarehouse-4.xlsm</a:t>
+            </a:r>
+          </a:p>
+        </p:txBody>
+      </p:sp>
+      <p:cxnSp>
+        <p:nvCxnSpPr>
+          <p:cNvPr id="75" name="Straight Connector 74">
+            <a:extLst>
+              <a:ext uri="{FF2B5EF4-FFF2-40B4-BE49-F238E27FC236}">
+                <a16:creationId xmlns:a16="http://schemas.microsoft.com/office/drawing/2014/main" id="{DB834A91-058F-4BB7-8E06-2A9DC722D458}"/>
+              </a:ext>
+            </a:extLst>
+          </p:cNvPr>
+          <p:cNvCxnSpPr>
+            <a:cxnSpLocks/>
+            <a:stCxn id="74" idx="3"/>
+            <a:endCxn id="15" idx="1"/>
+          </p:cNvCxnSpPr>
+          <p:nvPr/>
+        </p:nvCxnSpPr>
+        <p:spPr>
+          <a:xfrm flipV="1">
+            <a:off x="3147642" y="778598"/>
+            <a:ext cx="1324770" cy="159953"/>
+          </a:xfrm>
+          <a:prstGeom prst="line">
+            <a:avLst/>
+          </a:prstGeom>
+        </p:spPr>
+        <p:style>
+          <a:lnRef idx="1">
+            <a:schemeClr val="accent4"/>
+          </a:lnRef>
+          <a:fillRef idx="0">
+            <a:schemeClr val="accent4"/>
+          </a:fillRef>
+          <a:effectRef idx="0">
+            <a:schemeClr val="accent4"/>
+          </a:effectRef>
+          <a:fontRef idx="minor">
+            <a:schemeClr val="tx1"/>
+          </a:fontRef>
+        </p:style>
+      </p:cxnSp>
+      <p:cxnSp>
+        <p:nvCxnSpPr>
+          <p:cNvPr id="83" name="Straight Connector 82">
+            <a:extLst>
+              <a:ext uri="{FF2B5EF4-FFF2-40B4-BE49-F238E27FC236}">
+                <a16:creationId xmlns:a16="http://schemas.microsoft.com/office/drawing/2014/main" id="{4AABC1D8-9BE3-435A-B93F-D0485047D5AF}"/>
+              </a:ext>
+            </a:extLst>
+          </p:cNvPr>
+          <p:cNvCxnSpPr>
+            <a:cxnSpLocks/>
+            <a:stCxn id="74" idx="3"/>
+            <a:endCxn id="20" idx="1"/>
+          </p:cNvCxnSpPr>
+          <p:nvPr/>
+        </p:nvCxnSpPr>
+        <p:spPr>
+          <a:xfrm>
+            <a:off x="3147642" y="938551"/>
+            <a:ext cx="1324770" cy="993610"/>
+          </a:xfrm>
+          <a:prstGeom prst="line">
+            <a:avLst/>
+          </a:prstGeom>
+        </p:spPr>
+        <p:style>
+          <a:lnRef idx="1">
+            <a:schemeClr val="accent4"/>
+          </a:lnRef>
+          <a:fillRef idx="0">
+            <a:schemeClr val="accent4"/>
+          </a:fillRef>
+          <a:effectRef idx="0">
+            <a:schemeClr val="accent4"/>
+          </a:effectRef>
+          <a:fontRef idx="minor">
+            <a:schemeClr val="tx1"/>
+          </a:fontRef>
+        </p:style>
+      </p:cxnSp>
+      <p:sp>
+        <p:nvSpPr>
+          <p:cNvPr id="87" name="Rectangle 86">
+            <a:extLst>
+              <a:ext uri="{FF2B5EF4-FFF2-40B4-BE49-F238E27FC236}">
+                <a16:creationId xmlns:a16="http://schemas.microsoft.com/office/drawing/2014/main" id="{8A97EE6C-3B57-45D3-8D62-7FCF82F5C359}"/>
+              </a:ext>
+            </a:extLst>
+          </p:cNvPr>
+          <p:cNvSpPr/>
+          <p:nvPr/>
+        </p:nvSpPr>
+        <p:spPr>
+          <a:xfrm>
+            <a:off x="782246" y="1412231"/>
+            <a:ext cx="2372066" cy="479660"/>
+          </a:xfrm>
+          <a:prstGeom prst="rect">
+            <a:avLst/>
+          </a:prstGeom>
+          <a:solidFill>
+            <a:schemeClr val="accent4">
+              <a:lumMod val="20000"/>
+              <a:lumOff val="80000"/>
+            </a:schemeClr>
+          </a:solidFill>
+          <a:ln>
+            <a:solidFill>
+              <a:schemeClr val="tx1"/>
+            </a:solidFill>
+          </a:ln>
+        </p:spPr>
+        <p:style>
+          <a:lnRef idx="2">
+            <a:schemeClr val="accent1">
+              <a:shade val="50000"/>
+            </a:schemeClr>
+          </a:lnRef>
+          <a:fillRef idx="1">
+            <a:schemeClr val="accent1"/>
+          </a:fillRef>
+          <a:effectRef idx="0">
+            <a:schemeClr val="accent1"/>
+          </a:effectRef>
+          <a:fontRef idx="minor">
+            <a:schemeClr val="lt1"/>
+          </a:fontRef>
+        </p:style>
+        <p:txBody>
+          <a:bodyPr rtlCol="0" anchor="ctr"/>
+          <a:lstStyle/>
+          <a:p>
+            <a:pPr algn="ctr"/>
+            <a:r>
+              <a:rPr lang="en-US" sz="1400" dirty="0">
+                <a:solidFill>
+                  <a:sysClr val="windowText" lastClr="000000"/>
+                </a:solidFill>
+              </a:rPr>
+              <a:t>Directory-namestonaicscodes-2.xlsx</a:t>
+            </a:r>
+          </a:p>
+        </p:txBody>
+      </p:sp>
+      <p:cxnSp>
+        <p:nvCxnSpPr>
+          <p:cNvPr id="89" name="Straight Connector 88">
+            <a:extLst>
+              <a:ext uri="{FF2B5EF4-FFF2-40B4-BE49-F238E27FC236}">
+                <a16:creationId xmlns:a16="http://schemas.microsoft.com/office/drawing/2014/main" id="{7C8EFE64-CE65-41BA-BDDB-824B007585AB}"/>
+              </a:ext>
+            </a:extLst>
+          </p:cNvPr>
+          <p:cNvCxnSpPr>
+            <a:cxnSpLocks/>
+            <a:stCxn id="87" idx="3"/>
+            <a:endCxn id="15" idx="1"/>
+          </p:cNvCxnSpPr>
+          <p:nvPr/>
+        </p:nvCxnSpPr>
+        <p:spPr>
+          <a:xfrm flipV="1">
+            <a:off x="3154312" y="778598"/>
+            <a:ext cx="1318100" cy="873463"/>
+          </a:xfrm>
+          <a:prstGeom prst="line">
+            <a:avLst/>
+          </a:prstGeom>
+        </p:spPr>
+        <p:style>
+          <a:lnRef idx="1">
+            <a:schemeClr val="accent4"/>
+          </a:lnRef>
+          <a:fillRef idx="0">
+            <a:schemeClr val="accent4"/>
+          </a:fillRef>
+          <a:effectRef idx="0">
+            <a:schemeClr val="accent4"/>
+          </a:effectRef>
+          <a:fontRef idx="minor">
+            <a:schemeClr val="tx1"/>
+          </a:fontRef>
+        </p:style>
+      </p:cxnSp>
+      <p:cxnSp>
+        <p:nvCxnSpPr>
+          <p:cNvPr id="90" name="Straight Connector 89">
+            <a:extLst>
+              <a:ext uri="{FF2B5EF4-FFF2-40B4-BE49-F238E27FC236}">
+                <a16:creationId xmlns:a16="http://schemas.microsoft.com/office/drawing/2014/main" id="{15FDC950-BE15-4EF3-AD8C-DDABEDF89CCA}"/>
+              </a:ext>
+            </a:extLst>
+          </p:cNvPr>
+          <p:cNvCxnSpPr>
+            <a:cxnSpLocks/>
+            <a:stCxn id="87" idx="3"/>
+            <a:endCxn id="20" idx="1"/>
+          </p:cNvCxnSpPr>
+          <p:nvPr/>
+        </p:nvCxnSpPr>
+        <p:spPr>
+          <a:xfrm>
+            <a:off x="3154312" y="1652061"/>
+            <a:ext cx="1318100" cy="280100"/>
+          </a:xfrm>
+          <a:prstGeom prst="line">
+            <a:avLst/>
+          </a:prstGeom>
+        </p:spPr>
+        <p:style>
+          <a:lnRef idx="1">
+            <a:schemeClr val="accent4"/>
+          </a:lnRef>
+          <a:fillRef idx="0">
+            <a:schemeClr val="accent4"/>
+          </a:fillRef>
+          <a:effectRef idx="0">
+            <a:schemeClr val="accent4"/>
+          </a:effectRef>
+          <a:fontRef idx="minor">
+            <a:schemeClr val="tx1"/>
+          </a:fontRef>
+        </p:style>
+      </p:cxnSp>
+      <p:sp>
+        <p:nvSpPr>
+          <p:cNvPr id="92" name="Rectangle 91">
+            <a:extLst>
+              <a:ext uri="{FF2B5EF4-FFF2-40B4-BE49-F238E27FC236}">
+                <a16:creationId xmlns:a16="http://schemas.microsoft.com/office/drawing/2014/main" id="{805BF74E-FD5B-4C55-912B-3681ED0271A9}"/>
+              </a:ext>
+            </a:extLst>
+          </p:cNvPr>
+          <p:cNvSpPr/>
+          <p:nvPr/>
+        </p:nvSpPr>
+        <p:spPr>
+          <a:xfrm>
+            <a:off x="782246" y="32521"/>
+            <a:ext cx="2372066" cy="479660"/>
+          </a:xfrm>
+          <a:prstGeom prst="rect">
+            <a:avLst/>
+          </a:prstGeom>
+          <a:solidFill>
+            <a:schemeClr val="accent4">
+              <a:lumMod val="20000"/>
+              <a:lumOff val="80000"/>
+            </a:schemeClr>
+          </a:solidFill>
+          <a:ln>
+            <a:solidFill>
+              <a:schemeClr val="tx1"/>
+            </a:solidFill>
+          </a:ln>
+        </p:spPr>
+        <p:style>
+          <a:lnRef idx="2">
+            <a:schemeClr val="accent1">
+              <a:shade val="50000"/>
+            </a:schemeClr>
+          </a:lnRef>
+          <a:fillRef idx="1">
+            <a:schemeClr val="accent1"/>
+          </a:fillRef>
+          <a:effectRef idx="0">
+            <a:schemeClr val="accent1"/>
+          </a:effectRef>
+          <a:fontRef idx="minor">
+            <a:schemeClr val="lt1"/>
+          </a:fontRef>
+        </p:style>
+        <p:txBody>
+          <a:bodyPr rtlCol="0" anchor="ctr"/>
+          <a:lstStyle/>
+          <a:p>
+            <a:pPr algn="ctr"/>
+            <a:r>
+              <a:rPr lang="en-US" dirty="0">
+                <a:solidFill>
+                  <a:sysClr val="windowText" lastClr="000000"/>
+                </a:solidFill>
+              </a:rPr>
+              <a:t>Aggregation_tags.csv</a:t>
+            </a:r>
+          </a:p>
+        </p:txBody>
+      </p:sp>
+      <p:cxnSp>
+        <p:nvCxnSpPr>
+          <p:cNvPr id="93" name="Straight Connector 92">
+            <a:extLst>
+              <a:ext uri="{FF2B5EF4-FFF2-40B4-BE49-F238E27FC236}">
+                <a16:creationId xmlns:a16="http://schemas.microsoft.com/office/drawing/2014/main" id="{5AC11D6A-68B6-401A-B81B-016AF235E51D}"/>
+              </a:ext>
+            </a:extLst>
+          </p:cNvPr>
+          <p:cNvCxnSpPr>
+            <a:cxnSpLocks/>
+            <a:stCxn id="92" idx="3"/>
+            <a:endCxn id="15" idx="1"/>
+          </p:cNvCxnSpPr>
+          <p:nvPr/>
+        </p:nvCxnSpPr>
+        <p:spPr>
+          <a:xfrm>
+            <a:off x="3154312" y="272351"/>
+            <a:ext cx="1318100" cy="506247"/>
+          </a:xfrm>
+          <a:prstGeom prst="line">
+            <a:avLst/>
+          </a:prstGeom>
+        </p:spPr>
+        <p:style>
+          <a:lnRef idx="1">
+            <a:schemeClr val="accent4"/>
+          </a:lnRef>
+          <a:fillRef idx="0">
+            <a:schemeClr val="accent4"/>
+          </a:fillRef>
+          <a:effectRef idx="0">
+            <a:schemeClr val="accent4"/>
+          </a:effectRef>
+          <a:fontRef idx="minor">
+            <a:schemeClr val="tx1"/>
+          </a:fontRef>
+        </p:style>
+      </p:cxnSp>
+      <p:sp>
+        <p:nvSpPr>
+          <p:cNvPr id="103" name="Rectangle 102">
+            <a:extLst>
+              <a:ext uri="{FF2B5EF4-FFF2-40B4-BE49-F238E27FC236}">
+                <a16:creationId xmlns:a16="http://schemas.microsoft.com/office/drawing/2014/main" id="{49F249B5-5233-4D1E-A9C8-5C51ACE7F607}"/>
+              </a:ext>
+            </a:extLst>
+          </p:cNvPr>
+          <p:cNvSpPr/>
+          <p:nvPr/>
+        </p:nvSpPr>
+        <p:spPr>
+          <a:xfrm>
+            <a:off x="50691" y="5672055"/>
+            <a:ext cx="1561488" cy="273342"/>
+          </a:xfrm>
+          <a:prstGeom prst="rect">
+            <a:avLst/>
+          </a:prstGeom>
+          <a:solidFill>
+            <a:schemeClr val="accent4">
+              <a:lumMod val="20000"/>
+              <a:lumOff val="80000"/>
+            </a:schemeClr>
+          </a:solidFill>
+          <a:ln>
+            <a:solidFill>
+              <a:schemeClr val="tx1"/>
+            </a:solidFill>
+          </a:ln>
+        </p:spPr>
+        <p:style>
+          <a:lnRef idx="2">
+            <a:schemeClr val="accent1">
+              <a:shade val="50000"/>
+            </a:schemeClr>
+          </a:lnRef>
+          <a:fillRef idx="1">
+            <a:schemeClr val="accent1"/>
+          </a:fillRef>
+          <a:effectRef idx="0">
+            <a:schemeClr val="accent1"/>
+          </a:effectRef>
+          <a:fontRef idx="minor">
+            <a:schemeClr val="lt1"/>
+          </a:fontRef>
+        </p:style>
+        <p:txBody>
+          <a:bodyPr rtlCol="0" anchor="ctr"/>
+          <a:lstStyle/>
+          <a:p>
+            <a:pPr algn="ctr"/>
+            <a:r>
+              <a:rPr lang="en-US" sz="1200" dirty="0">
+                <a:solidFill>
+                  <a:sysClr val="windowText" lastClr="000000"/>
+                </a:solidFill>
+              </a:rPr>
+              <a:t>inputs</a:t>
+            </a:r>
+          </a:p>
+        </p:txBody>
+      </p:sp>
+      <p:sp>
+        <p:nvSpPr>
+          <p:cNvPr id="104" name="Rectangle 103">
+            <a:extLst>
+              <a:ext uri="{FF2B5EF4-FFF2-40B4-BE49-F238E27FC236}">
+                <a16:creationId xmlns:a16="http://schemas.microsoft.com/office/drawing/2014/main" id="{F5D4F512-0C72-4775-BFDB-D3B733D406EB}"/>
+              </a:ext>
+            </a:extLst>
+          </p:cNvPr>
+          <p:cNvSpPr/>
+          <p:nvPr/>
+        </p:nvSpPr>
+        <p:spPr>
+          <a:xfrm>
+            <a:off x="50691" y="5963962"/>
+            <a:ext cx="1561489" cy="273342"/>
+          </a:xfrm>
+          <a:prstGeom prst="rect">
+            <a:avLst/>
+          </a:prstGeom>
+        </p:spPr>
+        <p:style>
+          <a:lnRef idx="2">
+            <a:schemeClr val="accent1">
+              <a:shade val="50000"/>
+            </a:schemeClr>
+          </a:lnRef>
+          <a:fillRef idx="1">
+            <a:schemeClr val="accent1"/>
+          </a:fillRef>
+          <a:effectRef idx="0">
+            <a:schemeClr val="accent1"/>
+          </a:effectRef>
+          <a:fontRef idx="minor">
+            <a:schemeClr val="lt1"/>
+          </a:fontRef>
+        </p:style>
+        <p:txBody>
+          <a:bodyPr rtlCol="0" anchor="ctr"/>
+          <a:lstStyle/>
+          <a:p>
+            <a:pPr algn="ctr"/>
+            <a:r>
+              <a:rPr lang="en-US" sz="1200" dirty="0"/>
+              <a:t>core programs</a:t>
+            </a:r>
+          </a:p>
+        </p:txBody>
+      </p:sp>
+      <p:sp>
+        <p:nvSpPr>
+          <p:cNvPr id="105" name="Rectangle 104">
+            <a:extLst>
+              <a:ext uri="{FF2B5EF4-FFF2-40B4-BE49-F238E27FC236}">
+                <a16:creationId xmlns:a16="http://schemas.microsoft.com/office/drawing/2014/main" id="{55FE4485-C8DA-4828-ABFA-D9B96B081BBC}"/>
+              </a:ext>
+            </a:extLst>
+          </p:cNvPr>
+          <p:cNvSpPr/>
+          <p:nvPr/>
+        </p:nvSpPr>
+        <p:spPr>
+          <a:xfrm>
+            <a:off x="51885" y="6552735"/>
+            <a:ext cx="1561489" cy="273342"/>
+          </a:xfrm>
+          <a:prstGeom prst="rect">
+            <a:avLst/>
+          </a:prstGeom>
+          <a:solidFill>
+            <a:srgbClr val="FF0000"/>
+          </a:solidFill>
+        </p:spPr>
+        <p:style>
+          <a:lnRef idx="2">
+            <a:schemeClr val="accent1">
+              <a:shade val="50000"/>
+            </a:schemeClr>
+          </a:lnRef>
+          <a:fillRef idx="1">
+            <a:schemeClr val="accent1"/>
+          </a:fillRef>
+          <a:effectRef idx="0">
+            <a:schemeClr val="accent1"/>
+          </a:effectRef>
+          <a:fontRef idx="minor">
+            <a:schemeClr val="lt1"/>
+          </a:fontRef>
+        </p:style>
+        <p:txBody>
+          <a:bodyPr rtlCol="0" anchor="ctr"/>
+          <a:lstStyle/>
+          <a:p>
+            <a:pPr algn="ctr"/>
+            <a:r>
+              <a:rPr lang="en-US" sz="1200" dirty="0"/>
+              <a:t>outputs</a:t>
+            </a:r>
+          </a:p>
+        </p:txBody>
+      </p:sp>
+      <p:sp>
+        <p:nvSpPr>
+          <p:cNvPr id="106" name="Rectangle 105">
+            <a:extLst>
+              <a:ext uri="{FF2B5EF4-FFF2-40B4-BE49-F238E27FC236}">
+                <a16:creationId xmlns:a16="http://schemas.microsoft.com/office/drawing/2014/main" id="{FDAFAE74-B4DC-4064-A546-1F87D506AB27}"/>
+              </a:ext>
+            </a:extLst>
+          </p:cNvPr>
+          <p:cNvSpPr/>
+          <p:nvPr/>
+        </p:nvSpPr>
+        <p:spPr>
+          <a:xfrm>
+            <a:off x="50691" y="6255869"/>
+            <a:ext cx="1561489" cy="273342"/>
+          </a:xfrm>
+          <a:prstGeom prst="rect">
+            <a:avLst/>
+          </a:prstGeom>
+          <a:solidFill>
+            <a:schemeClr val="accent2"/>
+          </a:solidFill>
+        </p:spPr>
+        <p:style>
+          <a:lnRef idx="2">
+            <a:schemeClr val="accent1">
+              <a:shade val="50000"/>
+            </a:schemeClr>
+          </a:lnRef>
+          <a:fillRef idx="1">
+            <a:schemeClr val="accent1"/>
+          </a:fillRef>
+          <a:effectRef idx="0">
+            <a:schemeClr val="accent1"/>
+          </a:effectRef>
+          <a:fontRef idx="minor">
+            <a:schemeClr val="lt1"/>
+          </a:fontRef>
+        </p:style>
+        <p:txBody>
+          <a:bodyPr rtlCol="0" anchor="ctr"/>
+          <a:lstStyle/>
+          <a:p>
+            <a:pPr algn="ctr"/>
+            <a:r>
+              <a:rPr lang="en-US" sz="1200" dirty="0"/>
+              <a:t>core functions</a:t>
+            </a:r>
+          </a:p>
+        </p:txBody>
+      </p:sp>
     </p:spTree>
     <p:extLst>
       <p:ext uri="{BB962C8B-B14F-4D97-AF65-F5344CB8AC3E}">
         <p14:creationId xmlns:p14="http://schemas.microsoft.com/office/powerpoint/2010/main" val="3304412821"/>
+      </p:ext>
+    </p:extLst>
+  </p:cSld>
+  <p:clrMapOvr>
+    <a:masterClrMapping/>
+  </p:clrMapOvr>
+</p:sld>
+</file>
+
+<file path=ppt/slides/slide4.xml><?xml version="1.0" encoding="utf-8"?>
+<p:sld xmlns:a="http://schemas.openxmlformats.org/drawingml/2006/main" xmlns:r="http://schemas.openxmlformats.org/officeDocument/2006/relationships" xmlns:p="http://schemas.openxmlformats.org/presentationml/2006/main">
+  <p:cSld>
+    <p:spTree>
+      <p:nvGrpSpPr>
+        <p:cNvPr id="1" name=""/>
+        <p:cNvGrpSpPr/>
+        <p:nvPr/>
+      </p:nvGrpSpPr>
+      <p:grpSpPr>
+        <a:xfrm>
+          <a:off x="0" y="0"/>
+          <a:ext cx="0" cy="0"/>
+          <a:chOff x="0" y="0"/>
+          <a:chExt cx="0" cy="0"/>
+        </a:xfrm>
+      </p:grpSpPr>
+      <p:sp>
+        <p:nvSpPr>
+          <p:cNvPr id="2" name="Title 1">
+            <a:extLst>
+              <a:ext uri="{FF2B5EF4-FFF2-40B4-BE49-F238E27FC236}">
+                <a16:creationId xmlns:a16="http://schemas.microsoft.com/office/drawing/2014/main" id="{67A03E4A-E099-4FDC-AA4B-675A24851E05}"/>
+              </a:ext>
+            </a:extLst>
+          </p:cNvPr>
+          <p:cNvSpPr>
+            <a:spLocks noGrp="1"/>
+          </p:cNvSpPr>
+          <p:nvPr>
+            <p:ph type="title"/>
+          </p:nvPr>
+        </p:nvSpPr>
+        <p:spPr/>
+        <p:txBody>
+          <a:bodyPr/>
+          <a:lstStyle/>
+          <a:p>
+            <a:r>
+              <a:rPr lang="en-US" dirty="0"/>
+              <a:t>Core Programs</a:t>
+            </a:r>
+          </a:p>
+        </p:txBody>
+      </p:sp>
+      <p:sp>
+        <p:nvSpPr>
+          <p:cNvPr id="3" name="Content Placeholder 2">
+            <a:extLst>
+              <a:ext uri="{FF2B5EF4-FFF2-40B4-BE49-F238E27FC236}">
+                <a16:creationId xmlns:a16="http://schemas.microsoft.com/office/drawing/2014/main" id="{3C0F9A91-3557-4651-ABC2-505DB9D4ACC1}"/>
+              </a:ext>
+            </a:extLst>
+          </p:cNvPr>
+          <p:cNvSpPr>
+            <a:spLocks noGrp="1"/>
+          </p:cNvSpPr>
+          <p:nvPr>
+            <p:ph idx="1"/>
+          </p:nvPr>
+        </p:nvSpPr>
+        <p:spPr/>
+        <p:txBody>
+          <a:bodyPr/>
+          <a:lstStyle/>
+          <a:p>
+            <a:r>
+              <a:rPr lang="en-US" u="sng" dirty="0"/>
+              <a:t>metafile</a:t>
+            </a:r>
+            <a:r>
+              <a:rPr lang="en-US" dirty="0"/>
+              <a:t> : this guides the execution of the other programs</a:t>
+            </a:r>
+            <a:endParaRPr lang="en-US" u="sng" dirty="0"/>
+          </a:p>
+          <a:p>
+            <a:r>
+              <a:rPr lang="en-US" u="sng" dirty="0" err="1"/>
+              <a:t>statcan</a:t>
+            </a:r>
+            <a:r>
+              <a:rPr lang="en-US" u="sng" dirty="0"/>
+              <a:t>-pulls</a:t>
+            </a:r>
+            <a:r>
+              <a:rPr lang="en-US" dirty="0"/>
+              <a:t> : gets data from API, gets metadata from API, cleans and prepares the </a:t>
+            </a:r>
+            <a:r>
+              <a:rPr lang="en-US" dirty="0" err="1"/>
+              <a:t>dbs</a:t>
+            </a:r>
+            <a:r>
+              <a:rPr lang="en-US" dirty="0"/>
+              <a:t> for interpolation</a:t>
+            </a:r>
+          </a:p>
+          <a:p>
+            <a:r>
+              <a:rPr lang="en-US" u="sng" dirty="0" err="1"/>
+              <a:t>gapfill</a:t>
+            </a:r>
+            <a:r>
+              <a:rPr lang="en-US" dirty="0"/>
+              <a:t> : this is the core interpolation program, filling in gaps in all series besides real gross output, trend/</a:t>
+            </a:r>
+            <a:r>
+              <a:rPr lang="en-US" dirty="0" err="1"/>
+              <a:t>yhat</a:t>
+            </a:r>
+            <a:r>
+              <a:rPr lang="en-US" dirty="0"/>
+              <a:t>, and trade</a:t>
+            </a:r>
+          </a:p>
+          <a:p>
+            <a:r>
+              <a:rPr lang="en-US" u="sng" dirty="0" err="1"/>
+              <a:t>realgrossoutput</a:t>
+            </a:r>
+            <a:r>
+              <a:rPr lang="en-US" dirty="0"/>
+              <a:t> : builds the real gross output series</a:t>
+            </a:r>
+          </a:p>
+          <a:p>
+            <a:r>
+              <a:rPr lang="en-US" u="sng" dirty="0"/>
+              <a:t>trend</a:t>
+            </a:r>
+            <a:r>
+              <a:rPr lang="en-US" dirty="0"/>
+              <a:t> : builds the trend, </a:t>
+            </a:r>
+            <a:r>
+              <a:rPr lang="en-US" dirty="0" err="1"/>
+              <a:t>yhat</a:t>
+            </a:r>
+            <a:r>
+              <a:rPr lang="en-US" dirty="0"/>
+              <a:t>, and </a:t>
+            </a:r>
+            <a:r>
+              <a:rPr lang="en-US" dirty="0" err="1"/>
+              <a:t>cumod</a:t>
+            </a:r>
+            <a:r>
+              <a:rPr lang="en-US" dirty="0"/>
+              <a:t> series (it also does the </a:t>
+            </a:r>
+            <a:r>
+              <a:rPr lang="en-US" dirty="0" err="1"/>
+              <a:t>cumod</a:t>
+            </a:r>
+            <a:r>
+              <a:rPr lang="en-US" dirty="0"/>
+              <a:t> forecasts)</a:t>
+            </a:r>
+          </a:p>
+          <a:p>
+            <a:r>
+              <a:rPr lang="en-US" u="sng" dirty="0"/>
+              <a:t>trade</a:t>
+            </a:r>
+            <a:r>
+              <a:rPr lang="en-US" dirty="0"/>
+              <a:t> : builds the trade series</a:t>
+            </a:r>
+          </a:p>
+        </p:txBody>
+      </p:sp>
+    </p:spTree>
+    <p:extLst>
+      <p:ext uri="{BB962C8B-B14F-4D97-AF65-F5344CB8AC3E}">
+        <p14:creationId xmlns:p14="http://schemas.microsoft.com/office/powerpoint/2010/main" val="3874044249"/>
+      </p:ext>
+    </p:extLst>
+  </p:cSld>
+  <p:clrMapOvr>
+    <a:masterClrMapping/>
+  </p:clrMapOvr>
+</p:sld>
+</file>
+
+<file path=ppt/slides/slide5.xml><?xml version="1.0" encoding="utf-8"?>
+<p:sld xmlns:a="http://schemas.openxmlformats.org/drawingml/2006/main" xmlns:r="http://schemas.openxmlformats.org/officeDocument/2006/relationships" xmlns:p="http://schemas.openxmlformats.org/presentationml/2006/main">
+  <p:cSld>
+    <p:spTree>
+      <p:nvGrpSpPr>
+        <p:cNvPr id="1" name=""/>
+        <p:cNvGrpSpPr/>
+        <p:nvPr/>
+      </p:nvGrpSpPr>
+      <p:grpSpPr>
+        <a:xfrm>
+          <a:off x="0" y="0"/>
+          <a:ext cx="0" cy="0"/>
+          <a:chOff x="0" y="0"/>
+          <a:chExt cx="0" cy="0"/>
+        </a:xfrm>
+      </p:grpSpPr>
+      <p:sp>
+        <p:nvSpPr>
+          <p:cNvPr id="2" name="Title 1">
+            <a:extLst>
+              <a:ext uri="{FF2B5EF4-FFF2-40B4-BE49-F238E27FC236}">
+                <a16:creationId xmlns:a16="http://schemas.microsoft.com/office/drawing/2014/main" id="{A4913245-CE3F-448C-883F-F8E59B75B2DF}"/>
+              </a:ext>
+            </a:extLst>
+          </p:cNvPr>
+          <p:cNvSpPr>
+            <a:spLocks noGrp="1"/>
+          </p:cNvSpPr>
+          <p:nvPr>
+            <p:ph type="title"/>
+          </p:nvPr>
+        </p:nvSpPr>
+        <p:spPr/>
+        <p:txBody>
+          <a:bodyPr/>
+          <a:lstStyle/>
+          <a:p>
+            <a:endParaRPr lang="en-US" dirty="0"/>
+          </a:p>
+        </p:txBody>
+      </p:sp>
+      <p:sp>
+        <p:nvSpPr>
+          <p:cNvPr id="3" name="Content Placeholder 2">
+            <a:extLst>
+              <a:ext uri="{FF2B5EF4-FFF2-40B4-BE49-F238E27FC236}">
+                <a16:creationId xmlns:a16="http://schemas.microsoft.com/office/drawing/2014/main" id="{96E839CF-DF3C-41E9-A44E-FC7B80BF283F}"/>
+              </a:ext>
+            </a:extLst>
+          </p:cNvPr>
+          <p:cNvSpPr>
+            <a:spLocks noGrp="1"/>
+          </p:cNvSpPr>
+          <p:nvPr>
+            <p:ph idx="1"/>
+          </p:nvPr>
+        </p:nvSpPr>
+        <p:spPr>
+          <a:xfrm>
+            <a:off x="838200" y="1825625"/>
+            <a:ext cx="10515600" cy="4667250"/>
+          </a:xfrm>
+        </p:spPr>
+        <p:txBody>
+          <a:bodyPr>
+            <a:normAutofit fontScale="92500" lnSpcReduction="10000"/>
+          </a:bodyPr>
+          <a:lstStyle/>
+          <a:p>
+            <a:r>
+              <a:rPr lang="en-US" dirty="0"/>
+              <a:t>This program interacts with the Stat Can API. It pulls data, metadata, merges the two and does the initial cleaning.</a:t>
+            </a:r>
+          </a:p>
+          <a:p>
+            <a:r>
+              <a:rPr lang="en-US" dirty="0"/>
+              <a:t>Composed of 6 functions each of which can be run from the metafile:</a:t>
+            </a:r>
+          </a:p>
+          <a:p>
+            <a:pPr lvl="1"/>
+            <a:r>
+              <a:rPr lang="en-US" dirty="0" err="1">
+                <a:solidFill>
+                  <a:schemeClr val="accent2"/>
+                </a:solidFill>
+              </a:rPr>
+              <a:t>download_data</a:t>
+            </a:r>
+            <a:r>
+              <a:rPr lang="en-US" dirty="0">
+                <a:solidFill>
+                  <a:schemeClr val="accent2"/>
+                </a:solidFill>
+              </a:rPr>
+              <a:t> </a:t>
+            </a:r>
+            <a:r>
+              <a:rPr lang="en-US" dirty="0"/>
+              <a:t>: takes a list of vectors, a start date and end date and pulls the data from the </a:t>
+            </a:r>
+            <a:r>
+              <a:rPr lang="en-US" dirty="0" err="1"/>
+              <a:t>statcan</a:t>
+            </a:r>
+            <a:r>
+              <a:rPr lang="en-US" dirty="0"/>
+              <a:t> API (Note: in the last attempt, the API requests were timing out so as of now, the vector list gets split into groups of 100 blocks, each with ~300 vectors. The calls are then split into 3 separate lines)</a:t>
+            </a:r>
+            <a:endParaRPr lang="en-US" dirty="0">
+              <a:solidFill>
+                <a:schemeClr val="accent2"/>
+              </a:solidFill>
+            </a:endParaRPr>
+          </a:p>
+          <a:p>
+            <a:pPr lvl="1"/>
+            <a:r>
+              <a:rPr lang="en-US" dirty="0" err="1">
+                <a:solidFill>
+                  <a:schemeClr val="accent2"/>
+                </a:solidFill>
+              </a:rPr>
+              <a:t>clean_data_outputs</a:t>
+            </a:r>
+            <a:r>
+              <a:rPr lang="en-US" dirty="0">
+                <a:solidFill>
+                  <a:schemeClr val="accent2"/>
+                </a:solidFill>
+              </a:rPr>
+              <a:t> </a:t>
+            </a:r>
+            <a:r>
+              <a:rPr lang="en-US" dirty="0"/>
+              <a:t>: (after API outputs are filtered to just data) reshapes the data outputs into a table format</a:t>
+            </a:r>
+          </a:p>
+          <a:p>
+            <a:pPr lvl="1"/>
+            <a:r>
+              <a:rPr lang="en-US" dirty="0" err="1">
+                <a:solidFill>
+                  <a:schemeClr val="accent2"/>
+                </a:solidFill>
+              </a:rPr>
+              <a:t>download_metadata_pID</a:t>
+            </a:r>
+            <a:r>
+              <a:rPr lang="en-US" dirty="0">
+                <a:solidFill>
+                  <a:schemeClr val="accent2"/>
+                </a:solidFill>
+              </a:rPr>
+              <a:t> </a:t>
+            </a:r>
+            <a:r>
+              <a:rPr lang="en-US" dirty="0"/>
+              <a:t>: takes a list of table IDs and pulls the metadata</a:t>
+            </a:r>
+          </a:p>
+          <a:p>
+            <a:pPr lvl="1"/>
+            <a:r>
+              <a:rPr lang="en-US" dirty="0" err="1">
+                <a:solidFill>
+                  <a:schemeClr val="accent2"/>
+                </a:solidFill>
+              </a:rPr>
+              <a:t>clean_metadata_outputs</a:t>
+            </a:r>
+            <a:r>
+              <a:rPr lang="en-US" dirty="0">
+                <a:solidFill>
+                  <a:schemeClr val="accent2"/>
+                </a:solidFill>
+              </a:rPr>
+              <a:t> </a:t>
+            </a:r>
+            <a:r>
+              <a:rPr lang="en-US" dirty="0"/>
+              <a:t>: reshapes the meta data so it can be merged with the data</a:t>
+            </a:r>
+          </a:p>
+          <a:p>
+            <a:pPr lvl="1"/>
+            <a:r>
+              <a:rPr lang="en-US" dirty="0" err="1">
+                <a:solidFill>
+                  <a:schemeClr val="accent2"/>
+                </a:solidFill>
+              </a:rPr>
+              <a:t>merge_data_meta</a:t>
+            </a:r>
+            <a:r>
+              <a:rPr lang="en-US" dirty="0">
+                <a:solidFill>
+                  <a:schemeClr val="accent2"/>
+                </a:solidFill>
+              </a:rPr>
+              <a:t> </a:t>
+            </a:r>
+            <a:r>
+              <a:rPr lang="en-US" dirty="0"/>
+              <a:t>: merges the metadata and the data</a:t>
+            </a:r>
+          </a:p>
+          <a:p>
+            <a:pPr lvl="1"/>
+            <a:r>
+              <a:rPr lang="en-US" dirty="0" err="1">
+                <a:solidFill>
+                  <a:schemeClr val="accent2"/>
+                </a:solidFill>
+              </a:rPr>
+              <a:t>final_cleaning</a:t>
+            </a:r>
+            <a:r>
+              <a:rPr lang="en-US" dirty="0">
+                <a:solidFill>
+                  <a:schemeClr val="accent2"/>
+                </a:solidFill>
+              </a:rPr>
+              <a:t> </a:t>
+            </a:r>
+            <a:r>
+              <a:rPr lang="en-US" dirty="0"/>
+              <a:t>: cleans the database and prepares it for </a:t>
+            </a:r>
+            <a:r>
+              <a:rPr lang="en-US" dirty="0" err="1"/>
+              <a:t>gapfilling</a:t>
+            </a:r>
+            <a:endParaRPr lang="en-US" dirty="0"/>
+          </a:p>
+        </p:txBody>
+      </p:sp>
+      <p:sp>
+        <p:nvSpPr>
+          <p:cNvPr id="4" name="Rectangle 3">
+            <a:extLst>
+              <a:ext uri="{FF2B5EF4-FFF2-40B4-BE49-F238E27FC236}">
+                <a16:creationId xmlns:a16="http://schemas.microsoft.com/office/drawing/2014/main" id="{98853284-4B0A-47F4-A908-7850CBD93FE6}"/>
+              </a:ext>
+            </a:extLst>
+          </p:cNvPr>
+          <p:cNvSpPr/>
+          <p:nvPr/>
+        </p:nvSpPr>
+        <p:spPr>
+          <a:xfrm>
+            <a:off x="838199" y="365124"/>
+            <a:ext cx="3907971" cy="1325563"/>
+          </a:xfrm>
+          <a:prstGeom prst="rect">
+            <a:avLst/>
+          </a:prstGeom>
+        </p:spPr>
+        <p:style>
+          <a:lnRef idx="2">
+            <a:schemeClr val="accent1">
+              <a:shade val="50000"/>
+            </a:schemeClr>
+          </a:lnRef>
+          <a:fillRef idx="1">
+            <a:schemeClr val="accent1"/>
+          </a:fillRef>
+          <a:effectRef idx="0">
+            <a:schemeClr val="accent1"/>
+          </a:effectRef>
+          <a:fontRef idx="minor">
+            <a:schemeClr val="lt1"/>
+          </a:fontRef>
+        </p:style>
+        <p:txBody>
+          <a:bodyPr rtlCol="0" anchor="ctr"/>
+          <a:lstStyle/>
+          <a:p>
+            <a:pPr algn="ctr"/>
+            <a:r>
+              <a:rPr lang="en-US" sz="3200" dirty="0" err="1"/>
+              <a:t>statcan</a:t>
+            </a:r>
+            <a:r>
+              <a:rPr lang="en-US" sz="3200" dirty="0"/>
+              <a:t>-pulls</a:t>
+            </a:r>
+            <a:endParaRPr lang="en-US" dirty="0"/>
+          </a:p>
+        </p:txBody>
+      </p:sp>
+    </p:spTree>
+    <p:extLst>
+      <p:ext uri="{BB962C8B-B14F-4D97-AF65-F5344CB8AC3E}">
+        <p14:creationId xmlns:p14="http://schemas.microsoft.com/office/powerpoint/2010/main" val="13990037"/>
+      </p:ext>
+    </p:extLst>
+  </p:cSld>
+  <p:clrMapOvr>
+    <a:masterClrMapping/>
+  </p:clrMapOvr>
+</p:sld>
+</file>
+
+<file path=ppt/slides/slide6.xml><?xml version="1.0" encoding="utf-8"?>
+<p:sld xmlns:a="http://schemas.openxmlformats.org/drawingml/2006/main" xmlns:r="http://schemas.openxmlformats.org/officeDocument/2006/relationships" xmlns:p="http://schemas.openxmlformats.org/presentationml/2006/main">
+  <p:cSld>
+    <p:spTree>
+      <p:nvGrpSpPr>
+        <p:cNvPr id="1" name=""/>
+        <p:cNvGrpSpPr/>
+        <p:nvPr/>
+      </p:nvGrpSpPr>
+      <p:grpSpPr>
+        <a:xfrm>
+          <a:off x="0" y="0"/>
+          <a:ext cx="0" cy="0"/>
+          <a:chOff x="0" y="0"/>
+          <a:chExt cx="0" cy="0"/>
+        </a:xfrm>
+      </p:grpSpPr>
+      <p:sp>
+        <p:nvSpPr>
+          <p:cNvPr id="2" name="Title 1">
+            <a:extLst>
+              <a:ext uri="{FF2B5EF4-FFF2-40B4-BE49-F238E27FC236}">
+                <a16:creationId xmlns:a16="http://schemas.microsoft.com/office/drawing/2014/main" id="{A4913245-CE3F-448C-883F-F8E59B75B2DF}"/>
+              </a:ext>
+            </a:extLst>
+          </p:cNvPr>
+          <p:cNvSpPr>
+            <a:spLocks noGrp="1"/>
+          </p:cNvSpPr>
+          <p:nvPr>
+            <p:ph type="title"/>
+          </p:nvPr>
+        </p:nvSpPr>
+        <p:spPr/>
+        <p:txBody>
+          <a:bodyPr/>
+          <a:lstStyle/>
+          <a:p>
+            <a:r>
+              <a:rPr lang="en-US" dirty="0"/>
+              <a:t>					</a:t>
+            </a:r>
+          </a:p>
+        </p:txBody>
+      </p:sp>
+      <p:sp>
+        <p:nvSpPr>
+          <p:cNvPr id="3" name="Content Placeholder 2">
+            <a:extLst>
+              <a:ext uri="{FF2B5EF4-FFF2-40B4-BE49-F238E27FC236}">
+                <a16:creationId xmlns:a16="http://schemas.microsoft.com/office/drawing/2014/main" id="{96E839CF-DF3C-41E9-A44E-FC7B80BF283F}"/>
+              </a:ext>
+            </a:extLst>
+          </p:cNvPr>
+          <p:cNvSpPr>
+            <a:spLocks noGrp="1"/>
+          </p:cNvSpPr>
+          <p:nvPr>
+            <p:ph idx="1"/>
+          </p:nvPr>
+        </p:nvSpPr>
+        <p:spPr>
+          <a:xfrm>
+            <a:off x="838200" y="1825625"/>
+            <a:ext cx="8558349" cy="4351338"/>
+          </a:xfrm>
+        </p:spPr>
+        <p:txBody>
+          <a:bodyPr>
+            <a:normAutofit fontScale="92500" lnSpcReduction="10000"/>
+          </a:bodyPr>
+          <a:lstStyle/>
+          <a:p>
+            <a:r>
+              <a:rPr lang="en-US" u="sng" dirty="0"/>
+              <a:t>Vector list </a:t>
+            </a:r>
+            <a:r>
+              <a:rPr lang="en-US" dirty="0"/>
+              <a:t>– the list of all the vectors used in the </a:t>
+            </a:r>
+            <a:r>
+              <a:rPr lang="en-US" dirty="0" err="1"/>
+              <a:t>db</a:t>
+            </a:r>
+            <a:endParaRPr lang="en-US" dirty="0"/>
+          </a:p>
+          <a:p>
+            <a:r>
+              <a:rPr lang="en-US" u="sng" dirty="0"/>
+              <a:t>Table list   </a:t>
+            </a:r>
+            <a:r>
+              <a:rPr lang="en-US" dirty="0"/>
+              <a:t>- the list of all the tables used in the </a:t>
+            </a:r>
+            <a:r>
+              <a:rPr lang="en-US" dirty="0" err="1"/>
+              <a:t>db</a:t>
+            </a:r>
+            <a:endParaRPr lang="en-US" dirty="0"/>
+          </a:p>
+          <a:p>
+            <a:r>
+              <a:rPr lang="en-US" u="sng" dirty="0"/>
+              <a:t>Aggregation codes </a:t>
+            </a:r>
+            <a:r>
+              <a:rPr lang="en-US" dirty="0"/>
+              <a:t>– unfortunately </a:t>
+            </a:r>
+            <a:r>
+              <a:rPr lang="en-US" dirty="0" err="1"/>
+              <a:t>statcan</a:t>
+            </a:r>
+            <a:r>
+              <a:rPr lang="en-US" dirty="0"/>
+              <a:t> does not provide any information on how to aggregate individual series. As such, this file instructs the program on how to aggregate individual series. </a:t>
+            </a:r>
+          </a:p>
+          <a:p>
+            <a:r>
+              <a:rPr lang="en-US" u="sng" dirty="0"/>
+              <a:t>Start date </a:t>
+            </a:r>
+            <a:r>
+              <a:rPr lang="en-US" dirty="0"/>
+              <a:t>and </a:t>
+            </a:r>
+            <a:r>
+              <a:rPr lang="en-US" u="sng" dirty="0"/>
+              <a:t>end date</a:t>
+            </a:r>
+          </a:p>
+          <a:p>
+            <a:r>
+              <a:rPr lang="en-US" u="sng" dirty="0"/>
+              <a:t>Mapping</a:t>
+            </a:r>
+            <a:r>
+              <a:rPr lang="en-US" dirty="0"/>
+              <a:t> and </a:t>
+            </a:r>
+            <a:r>
+              <a:rPr lang="en-US" u="sng" dirty="0"/>
+              <a:t>Code list</a:t>
+            </a:r>
+            <a:r>
+              <a:rPr lang="en-US" dirty="0"/>
+              <a:t> - the mapping file instructs the program on how to aggregate series where necessary. The code list matches variable names with codes. Both are used in the </a:t>
+            </a:r>
+            <a:r>
+              <a:rPr lang="en-US" dirty="0" err="1"/>
+              <a:t>final_clean</a:t>
+            </a:r>
+            <a:r>
+              <a:rPr lang="en-US" dirty="0"/>
+              <a:t> function.</a:t>
+            </a:r>
+            <a:endParaRPr lang="en-US" u="sng" dirty="0"/>
+          </a:p>
+          <a:p>
+            <a:endParaRPr lang="en-US" dirty="0"/>
+          </a:p>
+        </p:txBody>
+      </p:sp>
+      <p:sp>
+        <p:nvSpPr>
+          <p:cNvPr id="4" name="Rectangle 3">
+            <a:extLst>
+              <a:ext uri="{FF2B5EF4-FFF2-40B4-BE49-F238E27FC236}">
+                <a16:creationId xmlns:a16="http://schemas.microsoft.com/office/drawing/2014/main" id="{98853284-4B0A-47F4-A908-7850CBD93FE6}"/>
+              </a:ext>
+            </a:extLst>
+          </p:cNvPr>
+          <p:cNvSpPr/>
+          <p:nvPr/>
+        </p:nvSpPr>
+        <p:spPr>
+          <a:xfrm>
+            <a:off x="838199" y="365124"/>
+            <a:ext cx="3907971" cy="1325563"/>
+          </a:xfrm>
+          <a:prstGeom prst="rect">
+            <a:avLst/>
+          </a:prstGeom>
+        </p:spPr>
+        <p:style>
+          <a:lnRef idx="2">
+            <a:schemeClr val="accent1">
+              <a:shade val="50000"/>
+            </a:schemeClr>
+          </a:lnRef>
+          <a:fillRef idx="1">
+            <a:schemeClr val="accent1"/>
+          </a:fillRef>
+          <a:effectRef idx="0">
+            <a:schemeClr val="accent1"/>
+          </a:effectRef>
+          <a:fontRef idx="minor">
+            <a:schemeClr val="lt1"/>
+          </a:fontRef>
+        </p:style>
+        <p:txBody>
+          <a:bodyPr rtlCol="0" anchor="ctr"/>
+          <a:lstStyle/>
+          <a:p>
+            <a:pPr algn="ctr"/>
+            <a:r>
+              <a:rPr lang="en-US" sz="3200" dirty="0" err="1"/>
+              <a:t>statcan</a:t>
+            </a:r>
+            <a:r>
+              <a:rPr lang="en-US" sz="3200" dirty="0"/>
+              <a:t>-pulls</a:t>
+            </a:r>
+            <a:endParaRPr lang="en-US" dirty="0"/>
+          </a:p>
+        </p:txBody>
+      </p:sp>
+      <p:sp>
+        <p:nvSpPr>
+          <p:cNvPr id="5" name="Rectangle 4">
+            <a:extLst>
+              <a:ext uri="{FF2B5EF4-FFF2-40B4-BE49-F238E27FC236}">
+                <a16:creationId xmlns:a16="http://schemas.microsoft.com/office/drawing/2014/main" id="{C5BC2997-F9E6-459D-9F42-B863AF7882E9}"/>
+              </a:ext>
+            </a:extLst>
+          </p:cNvPr>
+          <p:cNvSpPr/>
+          <p:nvPr/>
+        </p:nvSpPr>
+        <p:spPr>
+          <a:xfrm>
+            <a:off x="5031993" y="365124"/>
+            <a:ext cx="2997310" cy="1325563"/>
+          </a:xfrm>
+          <a:prstGeom prst="rect">
+            <a:avLst/>
+          </a:prstGeom>
+          <a:solidFill>
+            <a:schemeClr val="accent4">
+              <a:lumMod val="20000"/>
+              <a:lumOff val="80000"/>
+            </a:schemeClr>
+          </a:solidFill>
+          <a:ln>
+            <a:solidFill>
+              <a:schemeClr val="tx1"/>
+            </a:solidFill>
+          </a:ln>
+        </p:spPr>
+        <p:style>
+          <a:lnRef idx="2">
+            <a:schemeClr val="accent1">
+              <a:shade val="50000"/>
+            </a:schemeClr>
+          </a:lnRef>
+          <a:fillRef idx="1">
+            <a:schemeClr val="accent1"/>
+          </a:fillRef>
+          <a:effectRef idx="0">
+            <a:schemeClr val="accent1"/>
+          </a:effectRef>
+          <a:fontRef idx="minor">
+            <a:schemeClr val="lt1"/>
+          </a:fontRef>
+        </p:style>
+        <p:txBody>
+          <a:bodyPr rtlCol="0" anchor="ctr"/>
+          <a:lstStyle/>
+          <a:p>
+            <a:pPr algn="ctr"/>
+            <a:r>
+              <a:rPr lang="en-US" sz="3200" dirty="0">
+                <a:solidFill>
+                  <a:sysClr val="windowText" lastClr="000000"/>
+                </a:solidFill>
+              </a:rPr>
+              <a:t>inputs</a:t>
+            </a:r>
+            <a:endParaRPr lang="en-US" sz="1200" dirty="0">
+              <a:solidFill>
+                <a:sysClr val="windowText" lastClr="000000"/>
+              </a:solidFill>
+            </a:endParaRPr>
+          </a:p>
+        </p:txBody>
+      </p:sp>
+      <p:sp>
+        <p:nvSpPr>
+          <p:cNvPr id="6" name="Rectangle 5">
+            <a:extLst>
+              <a:ext uri="{FF2B5EF4-FFF2-40B4-BE49-F238E27FC236}">
+                <a16:creationId xmlns:a16="http://schemas.microsoft.com/office/drawing/2014/main" id="{3862965F-52D8-4BF4-94E4-C13C96FB2346}"/>
+              </a:ext>
+            </a:extLst>
+          </p:cNvPr>
+          <p:cNvSpPr/>
+          <p:nvPr/>
+        </p:nvSpPr>
+        <p:spPr>
+          <a:xfrm>
+            <a:off x="9597360" y="1825625"/>
+            <a:ext cx="2372066" cy="917574"/>
+          </a:xfrm>
+          <a:prstGeom prst="rect">
+            <a:avLst/>
+          </a:prstGeom>
+          <a:solidFill>
+            <a:schemeClr val="accent4">
+              <a:lumMod val="20000"/>
+              <a:lumOff val="80000"/>
+            </a:schemeClr>
+          </a:solidFill>
+          <a:ln>
+            <a:solidFill>
+              <a:schemeClr val="tx1"/>
+            </a:solidFill>
+          </a:ln>
+        </p:spPr>
+        <p:style>
+          <a:lnRef idx="2">
+            <a:schemeClr val="accent1">
+              <a:shade val="50000"/>
+            </a:schemeClr>
+          </a:lnRef>
+          <a:fillRef idx="1">
+            <a:schemeClr val="accent1"/>
+          </a:fillRef>
+          <a:effectRef idx="0">
+            <a:schemeClr val="accent1"/>
+          </a:effectRef>
+          <a:fontRef idx="minor">
+            <a:schemeClr val="lt1"/>
+          </a:fontRef>
+        </p:style>
+        <p:txBody>
+          <a:bodyPr rtlCol="0" anchor="ctr"/>
+          <a:lstStyle/>
+          <a:p>
+            <a:pPr algn="ctr"/>
+            <a:r>
+              <a:rPr lang="en-US" dirty="0">
+                <a:solidFill>
+                  <a:sysClr val="windowText" lastClr="000000"/>
+                </a:solidFill>
+              </a:rPr>
+              <a:t>DataWarehouse-4.xlsm</a:t>
+            </a:r>
+          </a:p>
+        </p:txBody>
+      </p:sp>
+      <p:sp>
+        <p:nvSpPr>
+          <p:cNvPr id="7" name="Rectangle 6">
+            <a:extLst>
+              <a:ext uri="{FF2B5EF4-FFF2-40B4-BE49-F238E27FC236}">
+                <a16:creationId xmlns:a16="http://schemas.microsoft.com/office/drawing/2014/main" id="{5B8353A7-26CC-4FC4-AE32-DBCED4F88351}"/>
+              </a:ext>
+            </a:extLst>
+          </p:cNvPr>
+          <p:cNvSpPr/>
+          <p:nvPr/>
+        </p:nvSpPr>
+        <p:spPr>
+          <a:xfrm>
+            <a:off x="9597360" y="4466210"/>
+            <a:ext cx="2372066" cy="479660"/>
+          </a:xfrm>
+          <a:prstGeom prst="rect">
+            <a:avLst/>
+          </a:prstGeom>
+          <a:solidFill>
+            <a:schemeClr val="accent4">
+              <a:lumMod val="20000"/>
+              <a:lumOff val="80000"/>
+            </a:schemeClr>
+          </a:solidFill>
+          <a:ln>
+            <a:solidFill>
+              <a:schemeClr val="tx1"/>
+            </a:solidFill>
+          </a:ln>
+        </p:spPr>
+        <p:style>
+          <a:lnRef idx="2">
+            <a:schemeClr val="accent1">
+              <a:shade val="50000"/>
+            </a:schemeClr>
+          </a:lnRef>
+          <a:fillRef idx="1">
+            <a:schemeClr val="accent1"/>
+          </a:fillRef>
+          <a:effectRef idx="0">
+            <a:schemeClr val="accent1"/>
+          </a:effectRef>
+          <a:fontRef idx="minor">
+            <a:schemeClr val="lt1"/>
+          </a:fontRef>
+        </p:style>
+        <p:txBody>
+          <a:bodyPr rtlCol="0" anchor="ctr"/>
+          <a:lstStyle/>
+          <a:p>
+            <a:pPr algn="ctr"/>
+            <a:r>
+              <a:rPr lang="en-US" sz="1400" dirty="0">
+                <a:solidFill>
+                  <a:sysClr val="windowText" lastClr="000000"/>
+                </a:solidFill>
+              </a:rPr>
+              <a:t>metafile</a:t>
+            </a:r>
+          </a:p>
+        </p:txBody>
+      </p:sp>
+      <p:sp>
+        <p:nvSpPr>
+          <p:cNvPr id="8" name="Rectangle 7">
+            <a:extLst>
+              <a:ext uri="{FF2B5EF4-FFF2-40B4-BE49-F238E27FC236}">
+                <a16:creationId xmlns:a16="http://schemas.microsoft.com/office/drawing/2014/main" id="{87F0DC01-E98D-4BF1-B815-0C75FA3D8BF0}"/>
+              </a:ext>
+            </a:extLst>
+          </p:cNvPr>
+          <p:cNvSpPr/>
+          <p:nvPr/>
+        </p:nvSpPr>
+        <p:spPr>
+          <a:xfrm>
+            <a:off x="9597360" y="2949340"/>
+            <a:ext cx="2372066" cy="1047894"/>
+          </a:xfrm>
+          <a:prstGeom prst="rect">
+            <a:avLst/>
+          </a:prstGeom>
+          <a:solidFill>
+            <a:schemeClr val="accent4">
+              <a:lumMod val="20000"/>
+              <a:lumOff val="80000"/>
+            </a:schemeClr>
+          </a:solidFill>
+          <a:ln>
+            <a:solidFill>
+              <a:schemeClr val="tx1"/>
+            </a:solidFill>
+          </a:ln>
+        </p:spPr>
+        <p:style>
+          <a:lnRef idx="2">
+            <a:schemeClr val="accent1">
+              <a:shade val="50000"/>
+            </a:schemeClr>
+          </a:lnRef>
+          <a:fillRef idx="1">
+            <a:schemeClr val="accent1"/>
+          </a:fillRef>
+          <a:effectRef idx="0">
+            <a:schemeClr val="accent1"/>
+          </a:effectRef>
+          <a:fontRef idx="minor">
+            <a:schemeClr val="lt1"/>
+          </a:fontRef>
+        </p:style>
+        <p:txBody>
+          <a:bodyPr rtlCol="0" anchor="ctr"/>
+          <a:lstStyle/>
+          <a:p>
+            <a:pPr algn="ctr"/>
+            <a:r>
+              <a:rPr lang="en-US" dirty="0">
+                <a:solidFill>
+                  <a:sysClr val="windowText" lastClr="000000"/>
+                </a:solidFill>
+              </a:rPr>
+              <a:t>Aggregation_tags.csv</a:t>
+            </a:r>
+          </a:p>
+        </p:txBody>
+      </p:sp>
+      <p:sp>
+        <p:nvSpPr>
+          <p:cNvPr id="9" name="Rectangle 8">
+            <a:extLst>
+              <a:ext uri="{FF2B5EF4-FFF2-40B4-BE49-F238E27FC236}">
+                <a16:creationId xmlns:a16="http://schemas.microsoft.com/office/drawing/2014/main" id="{6F61E7D6-851C-4A9B-A9E5-B732E857C084}"/>
+              </a:ext>
+            </a:extLst>
+          </p:cNvPr>
+          <p:cNvSpPr/>
+          <p:nvPr/>
+        </p:nvSpPr>
+        <p:spPr>
+          <a:xfrm>
+            <a:off x="9597360" y="5008871"/>
+            <a:ext cx="2372066" cy="479660"/>
+          </a:xfrm>
+          <a:prstGeom prst="rect">
+            <a:avLst/>
+          </a:prstGeom>
+          <a:solidFill>
+            <a:schemeClr val="accent4">
+              <a:lumMod val="20000"/>
+              <a:lumOff val="80000"/>
+            </a:schemeClr>
+          </a:solidFill>
+          <a:ln>
+            <a:solidFill>
+              <a:schemeClr val="tx1"/>
+            </a:solidFill>
+          </a:ln>
+        </p:spPr>
+        <p:style>
+          <a:lnRef idx="2">
+            <a:schemeClr val="accent1">
+              <a:shade val="50000"/>
+            </a:schemeClr>
+          </a:lnRef>
+          <a:fillRef idx="1">
+            <a:schemeClr val="accent1"/>
+          </a:fillRef>
+          <a:effectRef idx="0">
+            <a:schemeClr val="accent1"/>
+          </a:effectRef>
+          <a:fontRef idx="minor">
+            <a:schemeClr val="lt1"/>
+          </a:fontRef>
+        </p:style>
+        <p:txBody>
+          <a:bodyPr rtlCol="0" anchor="ctr"/>
+          <a:lstStyle/>
+          <a:p>
+            <a:pPr algn="ctr"/>
+            <a:r>
+              <a:rPr lang="en-US" sz="1400" dirty="0">
+                <a:solidFill>
+                  <a:sysClr val="windowText" lastClr="000000"/>
+                </a:solidFill>
+              </a:rPr>
+              <a:t>Directory-namestonaicscodes-2.xlsx</a:t>
+            </a:r>
+          </a:p>
+        </p:txBody>
+      </p:sp>
+    </p:spTree>
+    <p:extLst>
+      <p:ext uri="{BB962C8B-B14F-4D97-AF65-F5344CB8AC3E}">
+        <p14:creationId xmlns:p14="http://schemas.microsoft.com/office/powerpoint/2010/main" val="69601052"/>
+      </p:ext>
+    </p:extLst>
+  </p:cSld>
+  <p:clrMapOvr>
+    <a:masterClrMapping/>
+  </p:clrMapOvr>
+</p:sld>
+</file>
+
+<file path=ppt/slides/slide7.xml><?xml version="1.0" encoding="utf-8"?>
+<p:sld xmlns:a="http://schemas.openxmlformats.org/drawingml/2006/main" xmlns:r="http://schemas.openxmlformats.org/officeDocument/2006/relationships" xmlns:p="http://schemas.openxmlformats.org/presentationml/2006/main">
+  <p:cSld>
+    <p:spTree>
+      <p:nvGrpSpPr>
+        <p:cNvPr id="1" name=""/>
+        <p:cNvGrpSpPr/>
+        <p:nvPr/>
+      </p:nvGrpSpPr>
+      <p:grpSpPr>
+        <a:xfrm>
+          <a:off x="0" y="0"/>
+          <a:ext cx="0" cy="0"/>
+          <a:chOff x="0" y="0"/>
+          <a:chExt cx="0" cy="0"/>
+        </a:xfrm>
+      </p:grpSpPr>
+      <p:sp>
+        <p:nvSpPr>
+          <p:cNvPr id="2" name="Title 1">
+            <a:extLst>
+              <a:ext uri="{FF2B5EF4-FFF2-40B4-BE49-F238E27FC236}">
+                <a16:creationId xmlns:a16="http://schemas.microsoft.com/office/drawing/2014/main" id="{A4913245-CE3F-448C-883F-F8E59B75B2DF}"/>
+              </a:ext>
+            </a:extLst>
+          </p:cNvPr>
+          <p:cNvSpPr>
+            <a:spLocks noGrp="1"/>
+          </p:cNvSpPr>
+          <p:nvPr>
+            <p:ph type="title"/>
+          </p:nvPr>
+        </p:nvSpPr>
+        <p:spPr/>
+        <p:txBody>
+          <a:bodyPr/>
+          <a:lstStyle/>
+          <a:p>
+            <a:r>
+              <a:rPr lang="en-US" dirty="0"/>
+              <a:t>					</a:t>
+            </a:r>
+          </a:p>
+        </p:txBody>
+      </p:sp>
+      <p:sp>
+        <p:nvSpPr>
+          <p:cNvPr id="3" name="Content Placeholder 2">
+            <a:extLst>
+              <a:ext uri="{FF2B5EF4-FFF2-40B4-BE49-F238E27FC236}">
+                <a16:creationId xmlns:a16="http://schemas.microsoft.com/office/drawing/2014/main" id="{96E839CF-DF3C-41E9-A44E-FC7B80BF283F}"/>
+              </a:ext>
+            </a:extLst>
+          </p:cNvPr>
+          <p:cNvSpPr>
+            <a:spLocks noGrp="1"/>
+          </p:cNvSpPr>
+          <p:nvPr>
+            <p:ph idx="1"/>
+          </p:nvPr>
+        </p:nvSpPr>
+        <p:spPr>
+          <a:xfrm>
+            <a:off x="838200" y="1825625"/>
+            <a:ext cx="8558349" cy="4351338"/>
+          </a:xfrm>
+        </p:spPr>
+        <p:txBody>
+          <a:bodyPr>
+            <a:normAutofit/>
+          </a:bodyPr>
+          <a:lstStyle/>
+          <a:p>
+            <a:r>
+              <a:rPr lang="en-US" u="sng" dirty="0" err="1"/>
+              <a:t>envcandb-new.rds</a:t>
+            </a:r>
+            <a:r>
+              <a:rPr lang="en-US" dirty="0"/>
+              <a:t> – this will be the key input to the </a:t>
+            </a:r>
+            <a:r>
+              <a:rPr lang="en-US" dirty="0" err="1"/>
+              <a:t>gapfill</a:t>
+            </a:r>
+            <a:r>
+              <a:rPr lang="en-US" dirty="0"/>
+              <a:t> program</a:t>
+            </a:r>
+            <a:endParaRPr lang="en-US" u="sng" dirty="0"/>
+          </a:p>
+          <a:p>
+            <a:r>
+              <a:rPr lang="en-US" u="sng" dirty="0"/>
+              <a:t>metadata-</a:t>
+            </a:r>
+            <a:r>
+              <a:rPr lang="en-US" u="sng" dirty="0" err="1"/>
+              <a:t>new.rds</a:t>
+            </a:r>
+            <a:r>
+              <a:rPr lang="en-US" dirty="0"/>
+              <a:t> – this holds only the metadata (for reference)</a:t>
+            </a:r>
+            <a:endParaRPr lang="en-US" u="sng" dirty="0"/>
+          </a:p>
+          <a:p>
+            <a:r>
+              <a:rPr lang="en-US" u="sng" dirty="0"/>
+              <a:t>trade-</a:t>
+            </a:r>
+            <a:r>
+              <a:rPr lang="en-US" u="sng" dirty="0" err="1"/>
+              <a:t>new.rds</a:t>
+            </a:r>
+            <a:r>
+              <a:rPr lang="en-US" dirty="0"/>
+              <a:t> – this will be the key input to the trade program</a:t>
+            </a:r>
+          </a:p>
+        </p:txBody>
+      </p:sp>
+      <p:sp>
+        <p:nvSpPr>
+          <p:cNvPr id="4" name="Rectangle 3">
+            <a:extLst>
+              <a:ext uri="{FF2B5EF4-FFF2-40B4-BE49-F238E27FC236}">
+                <a16:creationId xmlns:a16="http://schemas.microsoft.com/office/drawing/2014/main" id="{98853284-4B0A-47F4-A908-7850CBD93FE6}"/>
+              </a:ext>
+            </a:extLst>
+          </p:cNvPr>
+          <p:cNvSpPr/>
+          <p:nvPr/>
+        </p:nvSpPr>
+        <p:spPr>
+          <a:xfrm>
+            <a:off x="838199" y="365124"/>
+            <a:ext cx="3907971" cy="1325563"/>
+          </a:xfrm>
+          <a:prstGeom prst="rect">
+            <a:avLst/>
+          </a:prstGeom>
+        </p:spPr>
+        <p:style>
+          <a:lnRef idx="2">
+            <a:schemeClr val="accent1">
+              <a:shade val="50000"/>
+            </a:schemeClr>
+          </a:lnRef>
+          <a:fillRef idx="1">
+            <a:schemeClr val="accent1"/>
+          </a:fillRef>
+          <a:effectRef idx="0">
+            <a:schemeClr val="accent1"/>
+          </a:effectRef>
+          <a:fontRef idx="minor">
+            <a:schemeClr val="lt1"/>
+          </a:fontRef>
+        </p:style>
+        <p:txBody>
+          <a:bodyPr rtlCol="0" anchor="ctr"/>
+          <a:lstStyle/>
+          <a:p>
+            <a:pPr algn="ctr"/>
+            <a:r>
+              <a:rPr lang="en-US" sz="3200" dirty="0" err="1"/>
+              <a:t>statcan</a:t>
+            </a:r>
+            <a:r>
+              <a:rPr lang="en-US" sz="3200" dirty="0"/>
+              <a:t>-pulls</a:t>
+            </a:r>
+            <a:endParaRPr lang="en-US" dirty="0"/>
+          </a:p>
+        </p:txBody>
+      </p:sp>
+      <p:sp>
+        <p:nvSpPr>
+          <p:cNvPr id="10" name="Rectangle 9">
+            <a:extLst>
+              <a:ext uri="{FF2B5EF4-FFF2-40B4-BE49-F238E27FC236}">
+                <a16:creationId xmlns:a16="http://schemas.microsoft.com/office/drawing/2014/main" id="{C0173095-62B7-4B05-A95D-EFC0655049C6}"/>
+              </a:ext>
+            </a:extLst>
+          </p:cNvPr>
+          <p:cNvSpPr/>
+          <p:nvPr/>
+        </p:nvSpPr>
+        <p:spPr>
+          <a:xfrm>
+            <a:off x="4902559" y="365124"/>
+            <a:ext cx="2943864" cy="1325562"/>
+          </a:xfrm>
+          <a:prstGeom prst="rect">
+            <a:avLst/>
+          </a:prstGeom>
+          <a:solidFill>
+            <a:srgbClr val="FF0000"/>
+          </a:solidFill>
+        </p:spPr>
+        <p:style>
+          <a:lnRef idx="2">
+            <a:schemeClr val="accent1">
+              <a:shade val="50000"/>
+            </a:schemeClr>
+          </a:lnRef>
+          <a:fillRef idx="1">
+            <a:schemeClr val="accent1"/>
+          </a:fillRef>
+          <a:effectRef idx="0">
+            <a:schemeClr val="accent1"/>
+          </a:effectRef>
+          <a:fontRef idx="minor">
+            <a:schemeClr val="lt1"/>
+          </a:fontRef>
+        </p:style>
+        <p:txBody>
+          <a:bodyPr rtlCol="0" anchor="ctr"/>
+          <a:lstStyle/>
+          <a:p>
+            <a:pPr algn="ctr"/>
+            <a:r>
+              <a:rPr lang="en-US" sz="3200" dirty="0"/>
+              <a:t>outputs</a:t>
+            </a:r>
+            <a:endParaRPr lang="en-US" sz="1200" dirty="0"/>
+          </a:p>
+        </p:txBody>
+      </p:sp>
+    </p:spTree>
+    <p:extLst>
+      <p:ext uri="{BB962C8B-B14F-4D97-AF65-F5344CB8AC3E}">
+        <p14:creationId xmlns:p14="http://schemas.microsoft.com/office/powerpoint/2010/main" val="4285604835"/>
+      </p:ext>
+    </p:extLst>
+  </p:cSld>
+  <p:clrMapOvr>
+    <a:masterClrMapping/>
+  </p:clrMapOvr>
+</p:sld>
+</file>
+
+<file path=ppt/slides/slide8.xml><?xml version="1.0" encoding="utf-8"?>
+<p:sld xmlns:a="http://schemas.openxmlformats.org/drawingml/2006/main" xmlns:r="http://schemas.openxmlformats.org/officeDocument/2006/relationships" xmlns:p="http://schemas.openxmlformats.org/presentationml/2006/main">
+  <p:cSld>
+    <p:spTree>
+      <p:nvGrpSpPr>
+        <p:cNvPr id="1" name=""/>
+        <p:cNvGrpSpPr/>
+        <p:nvPr/>
+      </p:nvGrpSpPr>
+      <p:grpSpPr>
+        <a:xfrm>
+          <a:off x="0" y="0"/>
+          <a:ext cx="0" cy="0"/>
+          <a:chOff x="0" y="0"/>
+          <a:chExt cx="0" cy="0"/>
+        </a:xfrm>
+      </p:grpSpPr>
+      <p:sp>
+        <p:nvSpPr>
+          <p:cNvPr id="2" name="Title 1">
+            <a:extLst>
+              <a:ext uri="{FF2B5EF4-FFF2-40B4-BE49-F238E27FC236}">
+                <a16:creationId xmlns:a16="http://schemas.microsoft.com/office/drawing/2014/main" id="{A4913245-CE3F-448C-883F-F8E59B75B2DF}"/>
+              </a:ext>
+            </a:extLst>
+          </p:cNvPr>
+          <p:cNvSpPr>
+            <a:spLocks noGrp="1"/>
+          </p:cNvSpPr>
+          <p:nvPr>
+            <p:ph type="title"/>
+          </p:nvPr>
+        </p:nvSpPr>
+        <p:spPr/>
+        <p:txBody>
+          <a:bodyPr/>
+          <a:lstStyle/>
+          <a:p>
+            <a:r>
+              <a:rPr lang="en-US" dirty="0"/>
+              <a:t>					</a:t>
+            </a:r>
+          </a:p>
+        </p:txBody>
+      </p:sp>
+      <p:sp>
+        <p:nvSpPr>
+          <p:cNvPr id="3" name="Content Placeholder 2">
+            <a:extLst>
+              <a:ext uri="{FF2B5EF4-FFF2-40B4-BE49-F238E27FC236}">
+                <a16:creationId xmlns:a16="http://schemas.microsoft.com/office/drawing/2014/main" id="{96E839CF-DF3C-41E9-A44E-FC7B80BF283F}"/>
+              </a:ext>
+            </a:extLst>
+          </p:cNvPr>
+          <p:cNvSpPr>
+            <a:spLocks noGrp="1"/>
+          </p:cNvSpPr>
+          <p:nvPr>
+            <p:ph idx="1"/>
+          </p:nvPr>
+        </p:nvSpPr>
+        <p:spPr>
+          <a:xfrm>
+            <a:off x="838200" y="1825625"/>
+            <a:ext cx="8558349" cy="4351338"/>
+          </a:xfrm>
+        </p:spPr>
+        <p:txBody>
+          <a:bodyPr>
+            <a:normAutofit/>
+          </a:bodyPr>
+          <a:lstStyle/>
+          <a:p>
+            <a:r>
+              <a:rPr lang="en-US" dirty="0"/>
+              <a:t>The main errors that can occur in this component is missing series, here are some possible reasons:</a:t>
+            </a:r>
+          </a:p>
+          <a:p>
+            <a:pPr lvl="1"/>
+            <a:r>
+              <a:rPr lang="en-US" dirty="0"/>
+              <a:t>Is the series in the vectors list?</a:t>
+            </a:r>
+          </a:p>
+          <a:p>
+            <a:pPr lvl="1"/>
+            <a:r>
+              <a:rPr lang="en-US" dirty="0"/>
+              <a:t>Is the series in the </a:t>
+            </a:r>
+            <a:r>
+              <a:rPr lang="en-US" dirty="0" err="1"/>
+              <a:t>final.rds</a:t>
+            </a:r>
+            <a:r>
+              <a:rPr lang="en-US" dirty="0"/>
+              <a:t> table? If so, it must be dropped in the </a:t>
+            </a:r>
+            <a:r>
+              <a:rPr lang="en-US" dirty="0" err="1"/>
+              <a:t>final_cleaning</a:t>
+            </a:r>
+            <a:r>
+              <a:rPr lang="en-US" dirty="0"/>
+              <a:t> function. Run this function line by line, checking for the point where the vector disappears.</a:t>
+            </a:r>
+          </a:p>
+          <a:p>
+            <a:pPr lvl="1"/>
+            <a:r>
+              <a:rPr lang="en-US" dirty="0"/>
+              <a:t>Should the series be aggregated, if so is it in the aggregation file?</a:t>
+            </a:r>
+          </a:p>
+          <a:p>
+            <a:pPr lvl="1"/>
+            <a:r>
+              <a:rPr lang="en-US" dirty="0"/>
+              <a:t>Does this series get constructed as a sum of others? If so, is it in the mapping file?</a:t>
+            </a:r>
+          </a:p>
+          <a:p>
+            <a:endParaRPr lang="en-US" dirty="0"/>
+          </a:p>
+        </p:txBody>
+      </p:sp>
+      <p:sp>
+        <p:nvSpPr>
+          <p:cNvPr id="4" name="Rectangle 3">
+            <a:extLst>
+              <a:ext uri="{FF2B5EF4-FFF2-40B4-BE49-F238E27FC236}">
+                <a16:creationId xmlns:a16="http://schemas.microsoft.com/office/drawing/2014/main" id="{98853284-4B0A-47F4-A908-7850CBD93FE6}"/>
+              </a:ext>
+            </a:extLst>
+          </p:cNvPr>
+          <p:cNvSpPr/>
+          <p:nvPr/>
+        </p:nvSpPr>
+        <p:spPr>
+          <a:xfrm>
+            <a:off x="838199" y="365124"/>
+            <a:ext cx="3907971" cy="1325563"/>
+          </a:xfrm>
+          <a:prstGeom prst="rect">
+            <a:avLst/>
+          </a:prstGeom>
+        </p:spPr>
+        <p:style>
+          <a:lnRef idx="2">
+            <a:schemeClr val="accent1">
+              <a:shade val="50000"/>
+            </a:schemeClr>
+          </a:lnRef>
+          <a:fillRef idx="1">
+            <a:schemeClr val="accent1"/>
+          </a:fillRef>
+          <a:effectRef idx="0">
+            <a:schemeClr val="accent1"/>
+          </a:effectRef>
+          <a:fontRef idx="minor">
+            <a:schemeClr val="lt1"/>
+          </a:fontRef>
+        </p:style>
+        <p:txBody>
+          <a:bodyPr rtlCol="0" anchor="ctr"/>
+          <a:lstStyle/>
+          <a:p>
+            <a:pPr algn="ctr"/>
+            <a:r>
+              <a:rPr lang="en-US" sz="3200" dirty="0" err="1"/>
+              <a:t>statcan</a:t>
+            </a:r>
+            <a:r>
+              <a:rPr lang="en-US" sz="3200" dirty="0"/>
+              <a:t>-pulls</a:t>
+            </a:r>
+            <a:endParaRPr lang="en-US" dirty="0"/>
+          </a:p>
+        </p:txBody>
+      </p:sp>
+      <p:sp>
+        <p:nvSpPr>
+          <p:cNvPr id="10" name="Rectangle 9">
+            <a:extLst>
+              <a:ext uri="{FF2B5EF4-FFF2-40B4-BE49-F238E27FC236}">
+                <a16:creationId xmlns:a16="http://schemas.microsoft.com/office/drawing/2014/main" id="{C0173095-62B7-4B05-A95D-EFC0655049C6}"/>
+              </a:ext>
+            </a:extLst>
+          </p:cNvPr>
+          <p:cNvSpPr/>
+          <p:nvPr/>
+        </p:nvSpPr>
+        <p:spPr>
+          <a:xfrm>
+            <a:off x="4902559" y="365124"/>
+            <a:ext cx="2943864" cy="1325562"/>
+          </a:xfrm>
+          <a:prstGeom prst="rect">
+            <a:avLst/>
+          </a:prstGeom>
+          <a:solidFill>
+            <a:schemeClr val="tx1"/>
+          </a:solidFill>
+        </p:spPr>
+        <p:style>
+          <a:lnRef idx="2">
+            <a:schemeClr val="accent1">
+              <a:shade val="50000"/>
+            </a:schemeClr>
+          </a:lnRef>
+          <a:fillRef idx="1">
+            <a:schemeClr val="accent1"/>
+          </a:fillRef>
+          <a:effectRef idx="0">
+            <a:schemeClr val="accent1"/>
+          </a:effectRef>
+          <a:fontRef idx="minor">
+            <a:schemeClr val="lt1"/>
+          </a:fontRef>
+        </p:style>
+        <p:txBody>
+          <a:bodyPr rtlCol="0" anchor="ctr"/>
+          <a:lstStyle/>
+          <a:p>
+            <a:pPr algn="ctr"/>
+            <a:r>
+              <a:rPr lang="en-US" sz="3200" dirty="0"/>
+              <a:t>Debugging</a:t>
+            </a:r>
+            <a:endParaRPr lang="en-US" sz="1200" dirty="0"/>
+          </a:p>
+        </p:txBody>
+      </p:sp>
+    </p:spTree>
+    <p:extLst>
+      <p:ext uri="{BB962C8B-B14F-4D97-AF65-F5344CB8AC3E}">
+        <p14:creationId xmlns:p14="http://schemas.microsoft.com/office/powerpoint/2010/main" val="3374671254"/>
       </p:ext>
     </p:extLst>
   </p:cSld>

</xml_diff>